<commit_message>
not worthit but doing an way
</commit_message>
<xml_diff>
--- a/related work presentation draft.pptx
+++ b/related work presentation draft.pptx
@@ -110,7 +110,16 @@
       </a:defRPr>
     </a:lvl9pPr>
   </p:defaultTextStyle>
+  <p:extLst>
+    <p:ext uri="{EFAFB233-063F-42B5-8137-9DF3F51BA10A}">
+      <p15:sldGuideLst xmlns:p15="http://schemas.microsoft.com/office/powerpoint/2012/main"/>
+    </p:ext>
+  </p:extLst>
 </p:presentation>
+</file>
+
+<file path=ppt/revisionInfo.xml><?xml version="1.0" encoding="utf-8"?>
+<p1510:revInfo xmlns:a="http://schemas.openxmlformats.org/drawingml/2006/main" xmlns:r="http://schemas.openxmlformats.org/officeDocument/2006/relationships" xmlns:p1510="http://schemas.microsoft.com/office/powerpoint/2015/10/main"/>
 </file>
 
 <file path=ppt/slideLayouts/slideLayout1.xml><?xml version="1.0" encoding="utf-8"?>

</xml_diff>

<commit_message>
fixing a mistake. should have a basic GUI up now
</commit_message>
<xml_diff>
--- a/related work presentation draft.pptx
+++ b/related work presentation draft.pptx
@@ -4,22 +4,20 @@
   <p:sldMasterIdLst>
     <p:sldMasterId id="2147483648" r:id="rId1"/>
   </p:sldMasterIdLst>
-  <p:notesMasterIdLst>
-    <p:notesMasterId r:id="rId14"/>
-  </p:notesMasterIdLst>
   <p:sldIdLst>
     <p:sldId id="256" r:id="rId2"/>
     <p:sldId id="257" r:id="rId3"/>
-    <p:sldId id="270" r:id="rId4"/>
-    <p:sldId id="261" r:id="rId5"/>
-    <p:sldId id="271" r:id="rId6"/>
-    <p:sldId id="272" r:id="rId7"/>
-    <p:sldId id="264" r:id="rId8"/>
-    <p:sldId id="265" r:id="rId9"/>
-    <p:sldId id="266" r:id="rId10"/>
-    <p:sldId id="267" r:id="rId11"/>
-    <p:sldId id="268" r:id="rId12"/>
-    <p:sldId id="269" r:id="rId13"/>
+    <p:sldId id="258" r:id="rId4"/>
+    <p:sldId id="260" r:id="rId5"/>
+    <p:sldId id="261" r:id="rId6"/>
+    <p:sldId id="262" r:id="rId7"/>
+    <p:sldId id="263" r:id="rId8"/>
+    <p:sldId id="264" r:id="rId9"/>
+    <p:sldId id="265" r:id="rId10"/>
+    <p:sldId id="266" r:id="rId11"/>
+    <p:sldId id="267" r:id="rId12"/>
+    <p:sldId id="268" r:id="rId13"/>
+    <p:sldId id="269" r:id="rId14"/>
   </p:sldIdLst>
   <p:sldSz cx="12192000" cy="6858000"/>
   <p:notesSz cx="6858000" cy="9144000"/>
@@ -141,682 +139,6 @@
 <p1510:revInfo xmlns:a="http://schemas.openxmlformats.org/drawingml/2006/main" xmlns:r="http://schemas.openxmlformats.org/officeDocument/2006/relationships" xmlns:p1510="http://schemas.microsoft.com/office/powerpoint/2015/10/main"/>
 </file>
 
-<file path=ppt/notesMasters/notesMaster1.xml><?xml version="1.0" encoding="utf-8"?>
-<p:notesMaster xmlns:a="http://schemas.openxmlformats.org/drawingml/2006/main" xmlns:r="http://schemas.openxmlformats.org/officeDocument/2006/relationships" xmlns:p="http://schemas.openxmlformats.org/presentationml/2006/main">
-  <p:cSld>
-    <p:bg>
-      <p:bgRef idx="1001">
-        <a:schemeClr val="bg1"/>
-      </p:bgRef>
-    </p:bg>
-    <p:spTree>
-      <p:nvGrpSpPr>
-        <p:cNvPr id="1" name=""/>
-        <p:cNvGrpSpPr/>
-        <p:nvPr/>
-      </p:nvGrpSpPr>
-      <p:grpSpPr>
-        <a:xfrm>
-          <a:off x="0" y="0"/>
-          <a:ext cx="0" cy="0"/>
-          <a:chOff x="0" y="0"/>
-          <a:chExt cx="0" cy="0"/>
-        </a:xfrm>
-      </p:grpSpPr>
-      <p:sp>
-        <p:nvSpPr>
-          <p:cNvPr id="2" name="Header Placeholder 1"/>
-          <p:cNvSpPr>
-            <a:spLocks noGrp="1"/>
-          </p:cNvSpPr>
-          <p:nvPr>
-            <p:ph type="hdr" sz="quarter"/>
-          </p:nvPr>
-        </p:nvSpPr>
-        <p:spPr>
-          <a:xfrm>
-            <a:off x="0" y="0"/>
-            <a:ext cx="2971800" cy="458788"/>
-          </a:xfrm>
-          <a:prstGeom prst="rect">
-            <a:avLst/>
-          </a:prstGeom>
-        </p:spPr>
-        <p:txBody>
-          <a:bodyPr vert="horz" lIns="91440" tIns="45720" rIns="91440" bIns="45720" rtlCol="0"/>
-          <a:lstStyle>
-            <a:lvl1pPr algn="l">
-              <a:defRPr sz="1200"/>
-            </a:lvl1pPr>
-          </a:lstStyle>
-          <a:p>
-            <a:endParaRPr lang="en-US"/>
-          </a:p>
-        </p:txBody>
-      </p:sp>
-      <p:sp>
-        <p:nvSpPr>
-          <p:cNvPr id="3" name="Date Placeholder 2"/>
-          <p:cNvSpPr>
-            <a:spLocks noGrp="1"/>
-          </p:cNvSpPr>
-          <p:nvPr>
-            <p:ph type="dt" idx="1"/>
-          </p:nvPr>
-        </p:nvSpPr>
-        <p:spPr>
-          <a:xfrm>
-            <a:off x="3884613" y="0"/>
-            <a:ext cx="2971800" cy="458788"/>
-          </a:xfrm>
-          <a:prstGeom prst="rect">
-            <a:avLst/>
-          </a:prstGeom>
-        </p:spPr>
-        <p:txBody>
-          <a:bodyPr vert="horz" lIns="91440" tIns="45720" rIns="91440" bIns="45720" rtlCol="0"/>
-          <a:lstStyle>
-            <a:lvl1pPr algn="r">
-              <a:defRPr sz="1200"/>
-            </a:lvl1pPr>
-          </a:lstStyle>
-          <a:p>
-            <a:fld id="{B13ACABE-A36C-4EAD-9489-3CF5823FAC6E}" type="datetimeFigureOut">
-              <a:rPr lang="en-US" smtClean="0"/>
-              <a:t>11/7/2017</a:t>
-            </a:fld>
-            <a:endParaRPr lang="en-US"/>
-          </a:p>
-        </p:txBody>
-      </p:sp>
-      <p:sp>
-        <p:nvSpPr>
-          <p:cNvPr id="4" name="Slide Image Placeholder 3"/>
-          <p:cNvSpPr>
-            <a:spLocks noGrp="1" noRot="1" noChangeAspect="1"/>
-          </p:cNvSpPr>
-          <p:nvPr>
-            <p:ph type="sldImg" idx="2"/>
-          </p:nvPr>
-        </p:nvSpPr>
-        <p:spPr>
-          <a:xfrm>
-            <a:off x="685800" y="1143000"/>
-            <a:ext cx="5486400" cy="3086100"/>
-          </a:xfrm>
-          <a:prstGeom prst="rect">
-            <a:avLst/>
-          </a:prstGeom>
-          <a:noFill/>
-          <a:ln w="12700">
-            <a:solidFill>
-              <a:prstClr val="black"/>
-            </a:solidFill>
-          </a:ln>
-        </p:spPr>
-        <p:txBody>
-          <a:bodyPr vert="horz" lIns="91440" tIns="45720" rIns="91440" bIns="45720" rtlCol="0" anchor="ctr"/>
-          <a:lstStyle/>
-          <a:p>
-            <a:endParaRPr lang="en-US"/>
-          </a:p>
-        </p:txBody>
-      </p:sp>
-      <p:sp>
-        <p:nvSpPr>
-          <p:cNvPr id="5" name="Notes Placeholder 4"/>
-          <p:cNvSpPr>
-            <a:spLocks noGrp="1"/>
-          </p:cNvSpPr>
-          <p:nvPr>
-            <p:ph type="body" sz="quarter" idx="3"/>
-          </p:nvPr>
-        </p:nvSpPr>
-        <p:spPr>
-          <a:xfrm>
-            <a:off x="685800" y="4400550"/>
-            <a:ext cx="5486400" cy="3600450"/>
-          </a:xfrm>
-          <a:prstGeom prst="rect">
-            <a:avLst/>
-          </a:prstGeom>
-        </p:spPr>
-        <p:txBody>
-          <a:bodyPr vert="horz" lIns="91440" tIns="45720" rIns="91440" bIns="45720" rtlCol="0"/>
-          <a:lstStyle/>
-          <a:p>
-            <a:pPr lvl="0"/>
-            <a:r>
-              <a:rPr lang="en-US"/>
-              <a:t>Edit Master text styles</a:t>
-            </a:r>
-          </a:p>
-          <a:p>
-            <a:pPr lvl="1"/>
-            <a:r>
-              <a:rPr lang="en-US"/>
-              <a:t>Second level</a:t>
-            </a:r>
-          </a:p>
-          <a:p>
-            <a:pPr lvl="2"/>
-            <a:r>
-              <a:rPr lang="en-US"/>
-              <a:t>Third level</a:t>
-            </a:r>
-          </a:p>
-          <a:p>
-            <a:pPr lvl="3"/>
-            <a:r>
-              <a:rPr lang="en-US"/>
-              <a:t>Fourth level</a:t>
-            </a:r>
-          </a:p>
-          <a:p>
-            <a:pPr lvl="4"/>
-            <a:r>
-              <a:rPr lang="en-US"/>
-              <a:t>Fifth level</a:t>
-            </a:r>
-          </a:p>
-        </p:txBody>
-      </p:sp>
-      <p:sp>
-        <p:nvSpPr>
-          <p:cNvPr id="6" name="Footer Placeholder 5"/>
-          <p:cNvSpPr>
-            <a:spLocks noGrp="1"/>
-          </p:cNvSpPr>
-          <p:nvPr>
-            <p:ph type="ftr" sz="quarter" idx="4"/>
-          </p:nvPr>
-        </p:nvSpPr>
-        <p:spPr>
-          <a:xfrm>
-            <a:off x="0" y="8685213"/>
-            <a:ext cx="2971800" cy="458787"/>
-          </a:xfrm>
-          <a:prstGeom prst="rect">
-            <a:avLst/>
-          </a:prstGeom>
-        </p:spPr>
-        <p:txBody>
-          <a:bodyPr vert="horz" lIns="91440" tIns="45720" rIns="91440" bIns="45720" rtlCol="0" anchor="b"/>
-          <a:lstStyle>
-            <a:lvl1pPr algn="l">
-              <a:defRPr sz="1200"/>
-            </a:lvl1pPr>
-          </a:lstStyle>
-          <a:p>
-            <a:endParaRPr lang="en-US"/>
-          </a:p>
-        </p:txBody>
-      </p:sp>
-      <p:sp>
-        <p:nvSpPr>
-          <p:cNvPr id="7" name="Slide Number Placeholder 6"/>
-          <p:cNvSpPr>
-            <a:spLocks noGrp="1"/>
-          </p:cNvSpPr>
-          <p:nvPr>
-            <p:ph type="sldNum" sz="quarter" idx="5"/>
-          </p:nvPr>
-        </p:nvSpPr>
-        <p:spPr>
-          <a:xfrm>
-            <a:off x="3884613" y="8685213"/>
-            <a:ext cx="2971800" cy="458787"/>
-          </a:xfrm>
-          <a:prstGeom prst="rect">
-            <a:avLst/>
-          </a:prstGeom>
-        </p:spPr>
-        <p:txBody>
-          <a:bodyPr vert="horz" lIns="91440" tIns="45720" rIns="91440" bIns="45720" rtlCol="0" anchor="b"/>
-          <a:lstStyle>
-            <a:lvl1pPr algn="r">
-              <a:defRPr sz="1200"/>
-            </a:lvl1pPr>
-          </a:lstStyle>
-          <a:p>
-            <a:fld id="{DC99A9F5-0CA7-4C48-B068-D3E0CFA2D3C2}" type="slidenum">
-              <a:rPr lang="en-US" smtClean="0"/>
-              <a:t>‹#›</a:t>
-            </a:fld>
-            <a:endParaRPr lang="en-US"/>
-          </a:p>
-        </p:txBody>
-      </p:sp>
-    </p:spTree>
-    <p:extLst>
-      <p:ext uri="{BB962C8B-B14F-4D97-AF65-F5344CB8AC3E}">
-        <p14:creationId xmlns:p14="http://schemas.microsoft.com/office/powerpoint/2010/main" val="2598539308"/>
-      </p:ext>
-    </p:extLst>
-  </p:cSld>
-  <p:clrMap bg1="lt1" tx1="dk1" bg2="lt2" tx2="dk2" accent1="accent1" accent2="accent2" accent3="accent3" accent4="accent4" accent5="accent5" accent6="accent6" hlink="hlink" folHlink="folHlink"/>
-  <p:notesStyle>
-    <a:lvl1pPr marL="0" algn="l" defTabSz="914400" rtl="0" eaLnBrk="1" latinLnBrk="0" hangingPunct="1">
-      <a:defRPr sz="1200" kern="1200">
-        <a:solidFill>
-          <a:schemeClr val="tx1"/>
-        </a:solidFill>
-        <a:latin typeface="+mn-lt"/>
-        <a:ea typeface="+mn-ea"/>
-        <a:cs typeface="+mn-cs"/>
-      </a:defRPr>
-    </a:lvl1pPr>
-    <a:lvl2pPr marL="457200" algn="l" defTabSz="914400" rtl="0" eaLnBrk="1" latinLnBrk="0" hangingPunct="1">
-      <a:defRPr sz="1200" kern="1200">
-        <a:solidFill>
-          <a:schemeClr val="tx1"/>
-        </a:solidFill>
-        <a:latin typeface="+mn-lt"/>
-        <a:ea typeface="+mn-ea"/>
-        <a:cs typeface="+mn-cs"/>
-      </a:defRPr>
-    </a:lvl2pPr>
-    <a:lvl3pPr marL="914400" algn="l" defTabSz="914400" rtl="0" eaLnBrk="1" latinLnBrk="0" hangingPunct="1">
-      <a:defRPr sz="1200" kern="1200">
-        <a:solidFill>
-          <a:schemeClr val="tx1"/>
-        </a:solidFill>
-        <a:latin typeface="+mn-lt"/>
-        <a:ea typeface="+mn-ea"/>
-        <a:cs typeface="+mn-cs"/>
-      </a:defRPr>
-    </a:lvl3pPr>
-    <a:lvl4pPr marL="1371600" algn="l" defTabSz="914400" rtl="0" eaLnBrk="1" latinLnBrk="0" hangingPunct="1">
-      <a:defRPr sz="1200" kern="1200">
-        <a:solidFill>
-          <a:schemeClr val="tx1"/>
-        </a:solidFill>
-        <a:latin typeface="+mn-lt"/>
-        <a:ea typeface="+mn-ea"/>
-        <a:cs typeface="+mn-cs"/>
-      </a:defRPr>
-    </a:lvl4pPr>
-    <a:lvl5pPr marL="1828800" algn="l" defTabSz="914400" rtl="0" eaLnBrk="1" latinLnBrk="0" hangingPunct="1">
-      <a:defRPr sz="1200" kern="1200">
-        <a:solidFill>
-          <a:schemeClr val="tx1"/>
-        </a:solidFill>
-        <a:latin typeface="+mn-lt"/>
-        <a:ea typeface="+mn-ea"/>
-        <a:cs typeface="+mn-cs"/>
-      </a:defRPr>
-    </a:lvl5pPr>
-    <a:lvl6pPr marL="2286000" algn="l" defTabSz="914400" rtl="0" eaLnBrk="1" latinLnBrk="0" hangingPunct="1">
-      <a:defRPr sz="1200" kern="1200">
-        <a:solidFill>
-          <a:schemeClr val="tx1"/>
-        </a:solidFill>
-        <a:latin typeface="+mn-lt"/>
-        <a:ea typeface="+mn-ea"/>
-        <a:cs typeface="+mn-cs"/>
-      </a:defRPr>
-    </a:lvl6pPr>
-    <a:lvl7pPr marL="2743200" algn="l" defTabSz="914400" rtl="0" eaLnBrk="1" latinLnBrk="0" hangingPunct="1">
-      <a:defRPr sz="1200" kern="1200">
-        <a:solidFill>
-          <a:schemeClr val="tx1"/>
-        </a:solidFill>
-        <a:latin typeface="+mn-lt"/>
-        <a:ea typeface="+mn-ea"/>
-        <a:cs typeface="+mn-cs"/>
-      </a:defRPr>
-    </a:lvl7pPr>
-    <a:lvl8pPr marL="3200400" algn="l" defTabSz="914400" rtl="0" eaLnBrk="1" latinLnBrk="0" hangingPunct="1">
-      <a:defRPr sz="1200" kern="1200">
-        <a:solidFill>
-          <a:schemeClr val="tx1"/>
-        </a:solidFill>
-        <a:latin typeface="+mn-lt"/>
-        <a:ea typeface="+mn-ea"/>
-        <a:cs typeface="+mn-cs"/>
-      </a:defRPr>
-    </a:lvl8pPr>
-    <a:lvl9pPr marL="3657600" algn="l" defTabSz="914400" rtl="0" eaLnBrk="1" latinLnBrk="0" hangingPunct="1">
-      <a:defRPr sz="1200" kern="1200">
-        <a:solidFill>
-          <a:schemeClr val="tx1"/>
-        </a:solidFill>
-        <a:latin typeface="+mn-lt"/>
-        <a:ea typeface="+mn-ea"/>
-        <a:cs typeface="+mn-cs"/>
-      </a:defRPr>
-    </a:lvl9pPr>
-  </p:notesStyle>
-</p:notesMaster>
-</file>
-
-<file path=ppt/notesSlides/notesSlide1.xml><?xml version="1.0" encoding="utf-8"?>
-<p:notes xmlns:a="http://schemas.openxmlformats.org/drawingml/2006/main" xmlns:r="http://schemas.openxmlformats.org/officeDocument/2006/relationships" xmlns:p="http://schemas.openxmlformats.org/presentationml/2006/main">
-  <p:cSld>
-    <p:spTree>
-      <p:nvGrpSpPr>
-        <p:cNvPr id="1" name=""/>
-        <p:cNvGrpSpPr/>
-        <p:nvPr/>
-      </p:nvGrpSpPr>
-      <p:grpSpPr>
-        <a:xfrm>
-          <a:off x="0" y="0"/>
-          <a:ext cx="0" cy="0"/>
-          <a:chOff x="0" y="0"/>
-          <a:chExt cx="0" cy="0"/>
-        </a:xfrm>
-      </p:grpSpPr>
-      <p:sp>
-        <p:nvSpPr>
-          <p:cNvPr id="2" name="Slide Image Placeholder 1"/>
-          <p:cNvSpPr>
-            <a:spLocks noGrp="1" noRot="1" noChangeAspect="1"/>
-          </p:cNvSpPr>
-          <p:nvPr>
-            <p:ph type="sldImg"/>
-          </p:nvPr>
-        </p:nvSpPr>
-        <p:spPr/>
-      </p:sp>
-      <p:sp>
-        <p:nvSpPr>
-          <p:cNvPr id="3" name="Notes Placeholder 2"/>
-          <p:cNvSpPr>
-            <a:spLocks noGrp="1"/>
-          </p:cNvSpPr>
-          <p:nvPr>
-            <p:ph type="body" idx="1"/>
-          </p:nvPr>
-        </p:nvSpPr>
-        <p:spPr/>
-        <p:txBody>
-          <a:bodyPr/>
-          <a:lstStyle/>
-          <a:p>
-            <a:r>
-              <a:rPr lang="en-US" dirty="0"/>
-              <a:t>The Application Will Be Handling Accounts Tied University Students and Staff </a:t>
-            </a:r>
-          </a:p>
-          <a:p>
-            <a:r>
-              <a:rPr lang="en-US" dirty="0"/>
-              <a:t>It Would Be Preferable To Piggyback Off the North Dakota University System (NDUS) Account System </a:t>
-            </a:r>
-          </a:p>
-          <a:p>
-            <a:endParaRPr lang="en-US" dirty="0"/>
-          </a:p>
-        </p:txBody>
-      </p:sp>
-      <p:sp>
-        <p:nvSpPr>
-          <p:cNvPr id="4" name="Slide Number Placeholder 3"/>
-          <p:cNvSpPr>
-            <a:spLocks noGrp="1"/>
-          </p:cNvSpPr>
-          <p:nvPr>
-            <p:ph type="sldNum" sz="quarter" idx="10"/>
-          </p:nvPr>
-        </p:nvSpPr>
-        <p:spPr/>
-        <p:txBody>
-          <a:bodyPr/>
-          <a:lstStyle/>
-          <a:p>
-            <a:fld id="{DC99A9F5-0CA7-4C48-B068-D3E0CFA2D3C2}" type="slidenum">
-              <a:rPr lang="en-US" smtClean="0"/>
-              <a:t>3</a:t>
-            </a:fld>
-            <a:endParaRPr lang="en-US"/>
-          </a:p>
-        </p:txBody>
-      </p:sp>
-    </p:spTree>
-    <p:extLst>
-      <p:ext uri="{BB962C8B-B14F-4D97-AF65-F5344CB8AC3E}">
-        <p14:creationId xmlns:p14="http://schemas.microsoft.com/office/powerpoint/2010/main" val="271928694"/>
-      </p:ext>
-    </p:extLst>
-  </p:cSld>
-  <p:clrMapOvr>
-    <a:masterClrMapping/>
-  </p:clrMapOvr>
-</p:notes>
-</file>
-
-<file path=ppt/notesSlides/notesSlide2.xml><?xml version="1.0" encoding="utf-8"?>
-<p:notes xmlns:a="http://schemas.openxmlformats.org/drawingml/2006/main" xmlns:r="http://schemas.openxmlformats.org/officeDocument/2006/relationships" xmlns:p="http://schemas.openxmlformats.org/presentationml/2006/main">
-  <p:cSld>
-    <p:spTree>
-      <p:nvGrpSpPr>
-        <p:cNvPr id="1" name=""/>
-        <p:cNvGrpSpPr/>
-        <p:nvPr/>
-      </p:nvGrpSpPr>
-      <p:grpSpPr>
-        <a:xfrm>
-          <a:off x="0" y="0"/>
-          <a:ext cx="0" cy="0"/>
-          <a:chOff x="0" y="0"/>
-          <a:chExt cx="0" cy="0"/>
-        </a:xfrm>
-      </p:grpSpPr>
-      <p:sp>
-        <p:nvSpPr>
-          <p:cNvPr id="2" name="Slide Image Placeholder 1"/>
-          <p:cNvSpPr>
-            <a:spLocks noGrp="1" noRot="1" noChangeAspect="1"/>
-          </p:cNvSpPr>
-          <p:nvPr>
-            <p:ph type="sldImg"/>
-          </p:nvPr>
-        </p:nvSpPr>
-        <p:spPr/>
-      </p:sp>
-      <p:sp>
-        <p:nvSpPr>
-          <p:cNvPr id="3" name="Notes Placeholder 2"/>
-          <p:cNvSpPr>
-            <a:spLocks noGrp="1"/>
-          </p:cNvSpPr>
-          <p:nvPr>
-            <p:ph type="body" idx="1"/>
-          </p:nvPr>
-        </p:nvSpPr>
-        <p:spPr/>
-        <p:txBody>
-          <a:bodyPr/>
-          <a:lstStyle/>
-          <a:p>
-            <a:r>
-              <a:rPr lang="en-US" dirty="0"/>
-              <a:t>The Applications Backend Will Be a SQL Server Bring </a:t>
-            </a:r>
-          </a:p>
-          <a:p>
-            <a:r>
-              <a:rPr lang="en-US" dirty="0"/>
-              <a:t>Knowing Possible Points Of Failure Allows For Countermeasures to be taken</a:t>
-            </a:r>
-          </a:p>
-          <a:p>
-            <a:r>
-              <a:rPr lang="en-US" dirty="0"/>
-              <a:t>Some Features Carry Security Requirements </a:t>
-            </a:r>
-          </a:p>
-          <a:p>
-            <a:endParaRPr lang="en-US" dirty="0"/>
-          </a:p>
-          <a:p>
-            <a:r>
-              <a:rPr lang="en-US" dirty="0"/>
-              <a:t>Provides the tools to be used to:</a:t>
-            </a:r>
-          </a:p>
-          <a:p>
-            <a:pPr lvl="1"/>
-            <a:r>
-              <a:rPr lang="en-US" dirty="0"/>
-              <a:t>Connect to the application</a:t>
-            </a:r>
-          </a:p>
-          <a:p>
-            <a:pPr lvl="1"/>
-            <a:r>
-              <a:rPr lang="en-US" dirty="0"/>
-              <a:t>Close security holes </a:t>
-            </a:r>
-          </a:p>
-          <a:p>
-            <a:pPr lvl="1"/>
-            <a:r>
-              <a:rPr lang="en-US" dirty="0"/>
-              <a:t>Connecting to the NDSU servers</a:t>
-            </a:r>
-          </a:p>
-          <a:p>
-            <a:endParaRPr lang="en-US" dirty="0"/>
-          </a:p>
-          <a:p>
-            <a:endParaRPr lang="en-US" dirty="0"/>
-          </a:p>
-        </p:txBody>
-      </p:sp>
-      <p:sp>
-        <p:nvSpPr>
-          <p:cNvPr id="4" name="Slide Number Placeholder 3"/>
-          <p:cNvSpPr>
-            <a:spLocks noGrp="1"/>
-          </p:cNvSpPr>
-          <p:nvPr>
-            <p:ph type="sldNum" sz="quarter" idx="10"/>
-          </p:nvPr>
-        </p:nvSpPr>
-        <p:spPr/>
-        <p:txBody>
-          <a:bodyPr/>
-          <a:lstStyle/>
-          <a:p>
-            <a:fld id="{DC99A9F5-0CA7-4C48-B068-D3E0CFA2D3C2}" type="slidenum">
-              <a:rPr lang="en-US" smtClean="0"/>
-              <a:t>5</a:t>
-            </a:fld>
-            <a:endParaRPr lang="en-US"/>
-          </a:p>
-        </p:txBody>
-      </p:sp>
-    </p:spTree>
-    <p:extLst>
-      <p:ext uri="{BB962C8B-B14F-4D97-AF65-F5344CB8AC3E}">
-        <p14:creationId xmlns:p14="http://schemas.microsoft.com/office/powerpoint/2010/main" val="226038275"/>
-      </p:ext>
-    </p:extLst>
-  </p:cSld>
-  <p:clrMapOvr>
-    <a:masterClrMapping/>
-  </p:clrMapOvr>
-</p:notes>
-</file>
-
-<file path=ppt/notesSlides/notesSlide3.xml><?xml version="1.0" encoding="utf-8"?>
-<p:notes xmlns:a="http://schemas.openxmlformats.org/drawingml/2006/main" xmlns:r="http://schemas.openxmlformats.org/officeDocument/2006/relationships" xmlns:p="http://schemas.openxmlformats.org/presentationml/2006/main">
-  <p:cSld>
-    <p:spTree>
-      <p:nvGrpSpPr>
-        <p:cNvPr id="1" name=""/>
-        <p:cNvGrpSpPr/>
-        <p:nvPr/>
-      </p:nvGrpSpPr>
-      <p:grpSpPr>
-        <a:xfrm>
-          <a:off x="0" y="0"/>
-          <a:ext cx="0" cy="0"/>
-          <a:chOff x="0" y="0"/>
-          <a:chExt cx="0" cy="0"/>
-        </a:xfrm>
-      </p:grpSpPr>
-      <p:sp>
-        <p:nvSpPr>
-          <p:cNvPr id="2" name="Slide Image Placeholder 1"/>
-          <p:cNvSpPr>
-            <a:spLocks noGrp="1" noRot="1" noChangeAspect="1"/>
-          </p:cNvSpPr>
-          <p:nvPr>
-            <p:ph type="sldImg"/>
-          </p:nvPr>
-        </p:nvSpPr>
-        <p:spPr/>
-      </p:sp>
-      <p:sp>
-        <p:nvSpPr>
-          <p:cNvPr id="3" name="Notes Placeholder 2"/>
-          <p:cNvSpPr>
-            <a:spLocks noGrp="1"/>
-          </p:cNvSpPr>
-          <p:nvPr>
-            <p:ph type="body" idx="1"/>
-          </p:nvPr>
-        </p:nvSpPr>
-        <p:spPr/>
-        <p:txBody>
-          <a:bodyPr/>
-          <a:lstStyle/>
-          <a:p>
-            <a:r>
-              <a:rPr lang="en-US" dirty="0"/>
-              <a:t>We Need to scan barcodes in a non rescores intensive way</a:t>
-            </a:r>
-          </a:p>
-          <a:p>
-            <a:r>
-              <a:rPr lang="en-US" dirty="0"/>
-              <a:t>Google will Continue to Update This Product and Document it’s Changes</a:t>
-            </a:r>
-          </a:p>
-          <a:p>
-            <a:endParaRPr lang="en-US" dirty="0"/>
-          </a:p>
-        </p:txBody>
-      </p:sp>
-      <p:sp>
-        <p:nvSpPr>
-          <p:cNvPr id="4" name="Slide Number Placeholder 3"/>
-          <p:cNvSpPr>
-            <a:spLocks noGrp="1"/>
-          </p:cNvSpPr>
-          <p:nvPr>
-            <p:ph type="sldNum" sz="quarter" idx="10"/>
-          </p:nvPr>
-        </p:nvSpPr>
-        <p:spPr/>
-        <p:txBody>
-          <a:bodyPr/>
-          <a:lstStyle/>
-          <a:p>
-            <a:fld id="{DC99A9F5-0CA7-4C48-B068-D3E0CFA2D3C2}" type="slidenum">
-              <a:rPr lang="en-US" smtClean="0"/>
-              <a:t>6</a:t>
-            </a:fld>
-            <a:endParaRPr lang="en-US"/>
-          </a:p>
-        </p:txBody>
-      </p:sp>
-    </p:spTree>
-    <p:extLst>
-      <p:ext uri="{BB962C8B-B14F-4D97-AF65-F5344CB8AC3E}">
-        <p14:creationId xmlns:p14="http://schemas.microsoft.com/office/powerpoint/2010/main" val="3494402211"/>
-      </p:ext>
-    </p:extLst>
-  </p:cSld>
-  <p:clrMapOvr>
-    <a:masterClrMapping/>
-  </p:clrMapOvr>
-</p:notes>
-</file>
-
 <file path=ppt/slideLayouts/slideLayout1.xml><?xml version="1.0" encoding="utf-8"?>
 <p:sldLayout xmlns:a="http://schemas.openxmlformats.org/drawingml/2006/main" xmlns:r="http://schemas.openxmlformats.org/officeDocument/2006/relationships" xmlns:p="http://schemas.openxmlformats.org/presentationml/2006/main" type="title" preserve="1">
   <p:cSld name="Title Slide">
@@ -964,7 +286,7 @@
           <a:p>
             <a:fld id="{0CC8767C-EF7E-4F10-9532-8582EF014B7B}" type="datetimeFigureOut">
               <a:rPr lang="en-US" smtClean="0"/>
-              <a:t>11/7/2017</a:t>
+              <a:t>11/1/2017</a:t>
             </a:fld>
             <a:endParaRPr lang="en-US"/>
           </a:p>
@@ -1162,7 +484,7 @@
           <a:p>
             <a:fld id="{0CC8767C-EF7E-4F10-9532-8582EF014B7B}" type="datetimeFigureOut">
               <a:rPr lang="en-US" smtClean="0"/>
-              <a:t>11/7/2017</a:t>
+              <a:t>11/1/2017</a:t>
             </a:fld>
             <a:endParaRPr lang="en-US"/>
           </a:p>
@@ -1370,7 +692,7 @@
           <a:p>
             <a:fld id="{0CC8767C-EF7E-4F10-9532-8582EF014B7B}" type="datetimeFigureOut">
               <a:rPr lang="en-US" smtClean="0"/>
-              <a:t>11/7/2017</a:t>
+              <a:t>11/1/2017</a:t>
             </a:fld>
             <a:endParaRPr lang="en-US"/>
           </a:p>
@@ -1568,7 +890,7 @@
           <a:p>
             <a:fld id="{0CC8767C-EF7E-4F10-9532-8582EF014B7B}" type="datetimeFigureOut">
               <a:rPr lang="en-US" smtClean="0"/>
-              <a:t>11/7/2017</a:t>
+              <a:t>11/1/2017</a:t>
             </a:fld>
             <a:endParaRPr lang="en-US"/>
           </a:p>
@@ -1843,7 +1165,7 @@
           <a:p>
             <a:fld id="{0CC8767C-EF7E-4F10-9532-8582EF014B7B}" type="datetimeFigureOut">
               <a:rPr lang="en-US" smtClean="0"/>
-              <a:t>11/7/2017</a:t>
+              <a:t>11/1/2017</a:t>
             </a:fld>
             <a:endParaRPr lang="en-US"/>
           </a:p>
@@ -2108,7 +1430,7 @@
           <a:p>
             <a:fld id="{0CC8767C-EF7E-4F10-9532-8582EF014B7B}" type="datetimeFigureOut">
               <a:rPr lang="en-US" smtClean="0"/>
-              <a:t>11/7/2017</a:t>
+              <a:t>11/1/2017</a:t>
             </a:fld>
             <a:endParaRPr lang="en-US"/>
           </a:p>
@@ -2520,7 +1842,7 @@
           <a:p>
             <a:fld id="{0CC8767C-EF7E-4F10-9532-8582EF014B7B}" type="datetimeFigureOut">
               <a:rPr lang="en-US" smtClean="0"/>
-              <a:t>11/7/2017</a:t>
+              <a:t>11/1/2017</a:t>
             </a:fld>
             <a:endParaRPr lang="en-US"/>
           </a:p>
@@ -2661,7 +1983,7 @@
           <a:p>
             <a:fld id="{0CC8767C-EF7E-4F10-9532-8582EF014B7B}" type="datetimeFigureOut">
               <a:rPr lang="en-US" smtClean="0"/>
-              <a:t>11/7/2017</a:t>
+              <a:t>11/1/2017</a:t>
             </a:fld>
             <a:endParaRPr lang="en-US"/>
           </a:p>
@@ -2774,7 +2096,7 @@
           <a:p>
             <a:fld id="{0CC8767C-EF7E-4F10-9532-8582EF014B7B}" type="datetimeFigureOut">
               <a:rPr lang="en-US" smtClean="0"/>
-              <a:t>11/7/2017</a:t>
+              <a:t>11/1/2017</a:t>
             </a:fld>
             <a:endParaRPr lang="en-US"/>
           </a:p>
@@ -3085,7 +2407,7 @@
           <a:p>
             <a:fld id="{0CC8767C-EF7E-4F10-9532-8582EF014B7B}" type="datetimeFigureOut">
               <a:rPr lang="en-US" smtClean="0"/>
-              <a:t>11/7/2017</a:t>
+              <a:t>11/1/2017</a:t>
             </a:fld>
             <a:endParaRPr lang="en-US"/>
           </a:p>
@@ -3373,7 +2695,7 @@
           <a:p>
             <a:fld id="{0CC8767C-EF7E-4F10-9532-8582EF014B7B}" type="datetimeFigureOut">
               <a:rPr lang="en-US" smtClean="0"/>
-              <a:t>11/7/2017</a:t>
+              <a:t>11/1/2017</a:t>
             </a:fld>
             <a:endParaRPr lang="en-US"/>
           </a:p>
@@ -3614,7 +2936,7 @@
           <a:p>
             <a:fld id="{0CC8767C-EF7E-4F10-9532-8582EF014B7B}" type="datetimeFigureOut">
               <a:rPr lang="en-US" smtClean="0"/>
-              <a:t>11/7/2017</a:t>
+              <a:t>11/1/2017</a:t>
             </a:fld>
             <a:endParaRPr lang="en-US"/>
           </a:p>
@@ -4148,13 +3470,7 @@
       </p:grpSpPr>
       <p:sp>
         <p:nvSpPr>
-          <p:cNvPr id="2" name="Title 1">
-            <a:extLst>
-              <a:ext uri="{FF2B5EF4-FFF2-40B4-BE49-F238E27FC236}">
-                <a16:creationId xmlns:a16="http://schemas.microsoft.com/office/drawing/2014/main" id="{5CCE5219-BA2A-441E-8452-F80006D64435}"/>
-              </a:ext>
-            </a:extLst>
-          </p:cNvPr>
+          <p:cNvPr id="2" name="Title 1"/>
           <p:cNvSpPr>
             <a:spLocks noGrp="1"/>
           </p:cNvSpPr>
@@ -4168,210 +3484,52 @@
           <a:lstStyle/>
           <a:p>
             <a:r>
-              <a:rPr lang="en-US" i="1" dirty="0"/>
-              <a:t>Microsoft Visual Studios</a:t>
-            </a:r>
-          </a:p>
-        </p:txBody>
-      </p:sp>
-      <p:sp>
-        <p:nvSpPr>
-          <p:cNvPr id="4" name="TextBox 3">
-            <a:extLst>
-              <a:ext uri="{FF2B5EF4-FFF2-40B4-BE49-F238E27FC236}">
-                <a16:creationId xmlns:a16="http://schemas.microsoft.com/office/drawing/2014/main" id="{35FEDF86-0880-4749-A49F-7F0519121EA1}"/>
-              </a:ext>
-            </a:extLst>
-          </p:cNvPr>
-          <p:cNvSpPr txBox="1"/>
-          <p:nvPr/>
-        </p:nvSpPr>
-        <p:spPr>
-          <a:xfrm>
-            <a:off x="838200" y="1459855"/>
-            <a:ext cx="4854632" cy="461665"/>
-          </a:xfrm>
-          <a:prstGeom prst="rect">
-            <a:avLst/>
-          </a:prstGeom>
-          <a:noFill/>
-        </p:spPr>
-        <p:txBody>
-          <a:bodyPr wrap="square" rtlCol="0">
-            <a:spAutoFit/>
-          </a:bodyPr>
-          <a:lstStyle/>
-          <a:p>
-            <a:r>
-              <a:rPr lang="en-US" sz="2400" b="1" dirty="0"/>
-              <a:t>Offers</a:t>
-            </a:r>
-          </a:p>
-        </p:txBody>
-      </p:sp>
-      <p:sp>
-        <p:nvSpPr>
-          <p:cNvPr id="5" name="TextBox 4">
-            <a:extLst>
-              <a:ext uri="{FF2B5EF4-FFF2-40B4-BE49-F238E27FC236}">
-                <a16:creationId xmlns:a16="http://schemas.microsoft.com/office/drawing/2014/main" id="{A3EA6AC5-0CE2-4683-A8B0-BE5E4C26EFF2}"/>
-              </a:ext>
-            </a:extLst>
-          </p:cNvPr>
-          <p:cNvSpPr txBox="1"/>
-          <p:nvPr/>
-        </p:nvSpPr>
-        <p:spPr>
-          <a:xfrm>
-            <a:off x="838200" y="1921520"/>
-            <a:ext cx="4854632" cy="1846659"/>
-          </a:xfrm>
-          <a:prstGeom prst="rect">
-            <a:avLst/>
-          </a:prstGeom>
-          <a:noFill/>
-        </p:spPr>
-        <p:txBody>
-          <a:bodyPr wrap="square" rtlCol="0">
-            <a:spAutoFit/>
-          </a:bodyPr>
-          <a:lstStyle/>
-          <a:p>
-            <a:pPr marL="285750" indent="-285750">
-              <a:buFont typeface="Arial" panose="020B0604020202020204" pitchFamily="34" charset="0"/>
-              <a:buChar char="•"/>
-            </a:pPr>
-            <a:r>
-              <a:rPr lang="en-US" sz="2400" dirty="0"/>
-              <a:t>.NET</a:t>
-            </a:r>
-          </a:p>
-          <a:p>
-            <a:pPr marL="285750" indent="-285750">
-              <a:buFont typeface="Arial" panose="020B0604020202020204" pitchFamily="34" charset="0"/>
-              <a:buChar char="•"/>
-            </a:pPr>
-            <a:r>
-              <a:rPr lang="en-US" sz="2400" dirty="0"/>
-              <a:t>Azure</a:t>
-            </a:r>
-          </a:p>
-          <a:p>
-            <a:pPr marL="285750" indent="-285750">
-              <a:buFont typeface="Arial" panose="020B0604020202020204" pitchFamily="34" charset="0"/>
-              <a:buChar char="•"/>
-            </a:pPr>
-            <a:r>
-              <a:rPr lang="en-US" sz="2400" dirty="0"/>
-              <a:t>Xamarin</a:t>
-            </a:r>
-          </a:p>
-          <a:p>
-            <a:pPr marL="285750" indent="-285750">
-              <a:buFont typeface="Arial" panose="020B0604020202020204" pitchFamily="34" charset="0"/>
-              <a:buChar char="•"/>
-            </a:pPr>
-            <a:endParaRPr lang="en-US" sz="2400" dirty="0"/>
-          </a:p>
-          <a:p>
-            <a:pPr marL="285750" indent="-285750">
-              <a:buFont typeface="Arial" panose="020B0604020202020204" pitchFamily="34" charset="0"/>
-              <a:buChar char="•"/>
-            </a:pPr>
-            <a:endParaRPr lang="en-US" dirty="0"/>
-          </a:p>
-        </p:txBody>
-      </p:sp>
-      <p:sp>
-        <p:nvSpPr>
-          <p:cNvPr id="6" name="TextBox 5">
-            <a:extLst>
-              <a:ext uri="{FF2B5EF4-FFF2-40B4-BE49-F238E27FC236}">
-                <a16:creationId xmlns:a16="http://schemas.microsoft.com/office/drawing/2014/main" id="{8F86A966-F811-4A4D-B19F-68A087362C7D}"/>
-              </a:ext>
-            </a:extLst>
-          </p:cNvPr>
-          <p:cNvSpPr txBox="1"/>
-          <p:nvPr/>
-        </p:nvSpPr>
-        <p:spPr>
-          <a:xfrm>
-            <a:off x="5692832" y="1506021"/>
-            <a:ext cx="2377440" cy="461665"/>
-          </a:xfrm>
-          <a:prstGeom prst="rect">
-            <a:avLst/>
-          </a:prstGeom>
-          <a:noFill/>
-        </p:spPr>
-        <p:txBody>
-          <a:bodyPr wrap="square" rtlCol="0">
-            <a:spAutoFit/>
-          </a:bodyPr>
-          <a:lstStyle/>
-          <a:p>
-            <a:r>
-              <a:rPr lang="en-US" sz="2400" b="1" dirty="0"/>
-              <a:t>How it affects us</a:t>
-            </a:r>
-          </a:p>
-        </p:txBody>
-      </p:sp>
-      <p:sp>
-        <p:nvSpPr>
-          <p:cNvPr id="7" name="TextBox 6">
-            <a:extLst>
-              <a:ext uri="{FF2B5EF4-FFF2-40B4-BE49-F238E27FC236}">
-                <a16:creationId xmlns:a16="http://schemas.microsoft.com/office/drawing/2014/main" id="{BF1449ED-421C-4F50-BEDE-C556AAD105AD}"/>
-              </a:ext>
-            </a:extLst>
-          </p:cNvPr>
-          <p:cNvSpPr txBox="1"/>
-          <p:nvPr/>
-        </p:nvSpPr>
-        <p:spPr>
-          <a:xfrm>
-            <a:off x="5692832" y="1967686"/>
-            <a:ext cx="4560916" cy="2308324"/>
-          </a:xfrm>
-          <a:prstGeom prst="rect">
-            <a:avLst/>
-          </a:prstGeom>
-          <a:noFill/>
-        </p:spPr>
-        <p:txBody>
-          <a:bodyPr wrap="square" rtlCol="0">
-            <a:spAutoFit/>
-          </a:bodyPr>
-          <a:lstStyle/>
-          <a:p>
-            <a:pPr marL="285750" indent="-285750">
-              <a:buFont typeface="Arial" panose="020B0604020202020204" pitchFamily="34" charset="0"/>
-              <a:buChar char="•"/>
-            </a:pPr>
-            <a:r>
-              <a:rPr lang="en-US" sz="2400" dirty="0"/>
-              <a:t>.NET provides Cross Platform </a:t>
-            </a:r>
-          </a:p>
-          <a:p>
-            <a:pPr marL="285750" indent="-285750">
-              <a:buFont typeface="Arial" panose="020B0604020202020204" pitchFamily="34" charset="0"/>
-              <a:buChar char="•"/>
-            </a:pPr>
-            <a:r>
-              <a:rPr lang="en-US" sz="2400" dirty="0"/>
-              <a:t>Azure allows secure remote connection to database</a:t>
-            </a:r>
-          </a:p>
-          <a:p>
-            <a:pPr marL="285750" indent="-285750">
-              <a:buFont typeface="Arial" panose="020B0604020202020204" pitchFamily="34" charset="0"/>
-              <a:buChar char="•"/>
-            </a:pPr>
-            <a:r>
-              <a:rPr lang="en-US" sz="2400" dirty="0"/>
-              <a:t>Xamarin offers more functions and can capture mobile functions.</a:t>
+              <a:rPr lang="en-US" dirty="0"/>
+              <a:t>LINQ</a:t>
+            </a:r>
+          </a:p>
+        </p:txBody>
+      </p:sp>
+      <p:sp>
+        <p:nvSpPr>
+          <p:cNvPr id="3" name="Content Placeholder 2"/>
+          <p:cNvSpPr>
+            <a:spLocks noGrp="1"/>
+          </p:cNvSpPr>
+          <p:nvPr>
+            <p:ph idx="1"/>
+          </p:nvPr>
+        </p:nvSpPr>
+        <p:spPr/>
+        <p:txBody>
+          <a:bodyPr/>
+          <a:lstStyle/>
+          <a:p>
+            <a:r>
+              <a:rPr lang="en-US" dirty="0"/>
+              <a:t>Eases the transition from object oriented languages to relational queries.</a:t>
+            </a:r>
+          </a:p>
+          <a:p>
+            <a:r>
+              <a:rPr lang="en-US" dirty="0"/>
+              <a:t>Can write database queries, inserts, updates, and deletes in languages like C# instead of SQL.</a:t>
+            </a:r>
+          </a:p>
+          <a:p>
+            <a:r>
+              <a:rPr lang="en-US" dirty="0"/>
+              <a:t>Integrated into Visual Studio and SQL Server.</a:t>
+            </a:r>
+          </a:p>
+          <a:p>
+            <a:r>
+              <a:rPr lang="en-US" dirty="0"/>
+              <a:t>Allows us to utilize SQL </a:t>
+            </a:r>
+            <a:r>
+              <a:rPr lang="en-US"/>
+              <a:t>Server’s security tools.</a:t>
             </a:r>
           </a:p>
         </p:txBody>
@@ -4379,7 +3537,7 @@
     </p:spTree>
     <p:extLst>
       <p:ext uri="{BB962C8B-B14F-4D97-AF65-F5344CB8AC3E}">
-        <p14:creationId xmlns:p14="http://schemas.microsoft.com/office/powerpoint/2010/main" val="684134583"/>
+        <p14:creationId xmlns:p14="http://schemas.microsoft.com/office/powerpoint/2010/main" val="3733634116"/>
       </p:ext>
     </p:extLst>
   </p:cSld>
@@ -4411,6 +3569,266 @@
           <p:cNvPr id="2" name="Title 1">
             <a:extLst>
               <a:ext uri="{FF2B5EF4-FFF2-40B4-BE49-F238E27FC236}">
+                <a16:creationId xmlns:a16="http://schemas.microsoft.com/office/drawing/2014/main" id="{5CCE5219-BA2A-441E-8452-F80006D64435}"/>
+              </a:ext>
+            </a:extLst>
+          </p:cNvPr>
+          <p:cNvSpPr>
+            <a:spLocks noGrp="1"/>
+          </p:cNvSpPr>
+          <p:nvPr>
+            <p:ph type="title"/>
+          </p:nvPr>
+        </p:nvSpPr>
+        <p:spPr/>
+        <p:txBody>
+          <a:bodyPr/>
+          <a:lstStyle/>
+          <a:p>
+            <a:r>
+              <a:rPr lang="en-US" i="1" dirty="0"/>
+              <a:t>Microsoft Visual Studios</a:t>
+            </a:r>
+          </a:p>
+        </p:txBody>
+      </p:sp>
+      <p:sp>
+        <p:nvSpPr>
+          <p:cNvPr id="4" name="TextBox 3">
+            <a:extLst>
+              <a:ext uri="{FF2B5EF4-FFF2-40B4-BE49-F238E27FC236}">
+                <a16:creationId xmlns:a16="http://schemas.microsoft.com/office/drawing/2014/main" id="{35FEDF86-0880-4749-A49F-7F0519121EA1}"/>
+              </a:ext>
+            </a:extLst>
+          </p:cNvPr>
+          <p:cNvSpPr txBox="1"/>
+          <p:nvPr/>
+        </p:nvSpPr>
+        <p:spPr>
+          <a:xfrm>
+            <a:off x="838200" y="1459855"/>
+            <a:ext cx="4854632" cy="461665"/>
+          </a:xfrm>
+          <a:prstGeom prst="rect">
+            <a:avLst/>
+          </a:prstGeom>
+          <a:noFill/>
+        </p:spPr>
+        <p:txBody>
+          <a:bodyPr wrap="square" rtlCol="0">
+            <a:spAutoFit/>
+          </a:bodyPr>
+          <a:lstStyle/>
+          <a:p>
+            <a:r>
+              <a:rPr lang="en-US" sz="2400" b="1" dirty="0"/>
+              <a:t>Offers</a:t>
+            </a:r>
+          </a:p>
+        </p:txBody>
+      </p:sp>
+      <p:sp>
+        <p:nvSpPr>
+          <p:cNvPr id="5" name="TextBox 4">
+            <a:extLst>
+              <a:ext uri="{FF2B5EF4-FFF2-40B4-BE49-F238E27FC236}">
+                <a16:creationId xmlns:a16="http://schemas.microsoft.com/office/drawing/2014/main" id="{A3EA6AC5-0CE2-4683-A8B0-BE5E4C26EFF2}"/>
+              </a:ext>
+            </a:extLst>
+          </p:cNvPr>
+          <p:cNvSpPr txBox="1"/>
+          <p:nvPr/>
+        </p:nvSpPr>
+        <p:spPr>
+          <a:xfrm>
+            <a:off x="838200" y="1921520"/>
+            <a:ext cx="4854632" cy="1846659"/>
+          </a:xfrm>
+          <a:prstGeom prst="rect">
+            <a:avLst/>
+          </a:prstGeom>
+          <a:noFill/>
+        </p:spPr>
+        <p:txBody>
+          <a:bodyPr wrap="square" rtlCol="0">
+            <a:spAutoFit/>
+          </a:bodyPr>
+          <a:lstStyle/>
+          <a:p>
+            <a:pPr marL="285750" indent="-285750">
+              <a:buFont typeface="Arial" panose="020B0604020202020204" pitchFamily="34" charset="0"/>
+              <a:buChar char="•"/>
+            </a:pPr>
+            <a:r>
+              <a:rPr lang="en-US" sz="2400" dirty="0"/>
+              <a:t>.NET</a:t>
+            </a:r>
+          </a:p>
+          <a:p>
+            <a:pPr marL="285750" indent="-285750">
+              <a:buFont typeface="Arial" panose="020B0604020202020204" pitchFamily="34" charset="0"/>
+              <a:buChar char="•"/>
+            </a:pPr>
+            <a:r>
+              <a:rPr lang="en-US" sz="2400" dirty="0"/>
+              <a:t>Azure</a:t>
+            </a:r>
+          </a:p>
+          <a:p>
+            <a:pPr marL="285750" indent="-285750">
+              <a:buFont typeface="Arial" panose="020B0604020202020204" pitchFamily="34" charset="0"/>
+              <a:buChar char="•"/>
+            </a:pPr>
+            <a:r>
+              <a:rPr lang="en-US" sz="2400" dirty="0"/>
+              <a:t>Xamarin</a:t>
+            </a:r>
+          </a:p>
+          <a:p>
+            <a:pPr marL="285750" indent="-285750">
+              <a:buFont typeface="Arial" panose="020B0604020202020204" pitchFamily="34" charset="0"/>
+              <a:buChar char="•"/>
+            </a:pPr>
+            <a:endParaRPr lang="en-US" sz="2400" dirty="0"/>
+          </a:p>
+          <a:p>
+            <a:pPr marL="285750" indent="-285750">
+              <a:buFont typeface="Arial" panose="020B0604020202020204" pitchFamily="34" charset="0"/>
+              <a:buChar char="•"/>
+            </a:pPr>
+            <a:endParaRPr lang="en-US" dirty="0"/>
+          </a:p>
+        </p:txBody>
+      </p:sp>
+      <p:sp>
+        <p:nvSpPr>
+          <p:cNvPr id="6" name="TextBox 5">
+            <a:extLst>
+              <a:ext uri="{FF2B5EF4-FFF2-40B4-BE49-F238E27FC236}">
+                <a16:creationId xmlns:a16="http://schemas.microsoft.com/office/drawing/2014/main" id="{8F86A966-F811-4A4D-B19F-68A087362C7D}"/>
+              </a:ext>
+            </a:extLst>
+          </p:cNvPr>
+          <p:cNvSpPr txBox="1"/>
+          <p:nvPr/>
+        </p:nvSpPr>
+        <p:spPr>
+          <a:xfrm>
+            <a:off x="5692832" y="1506021"/>
+            <a:ext cx="2377440" cy="461665"/>
+          </a:xfrm>
+          <a:prstGeom prst="rect">
+            <a:avLst/>
+          </a:prstGeom>
+          <a:noFill/>
+        </p:spPr>
+        <p:txBody>
+          <a:bodyPr wrap="square" rtlCol="0">
+            <a:spAutoFit/>
+          </a:bodyPr>
+          <a:lstStyle/>
+          <a:p>
+            <a:r>
+              <a:rPr lang="en-US" sz="2400" b="1" dirty="0"/>
+              <a:t>How it affects us</a:t>
+            </a:r>
+          </a:p>
+        </p:txBody>
+      </p:sp>
+      <p:sp>
+        <p:nvSpPr>
+          <p:cNvPr id="7" name="TextBox 6">
+            <a:extLst>
+              <a:ext uri="{FF2B5EF4-FFF2-40B4-BE49-F238E27FC236}">
+                <a16:creationId xmlns:a16="http://schemas.microsoft.com/office/drawing/2014/main" id="{BF1449ED-421C-4F50-BEDE-C556AAD105AD}"/>
+              </a:ext>
+            </a:extLst>
+          </p:cNvPr>
+          <p:cNvSpPr txBox="1"/>
+          <p:nvPr/>
+        </p:nvSpPr>
+        <p:spPr>
+          <a:xfrm>
+            <a:off x="5692832" y="1967686"/>
+            <a:ext cx="4560916" cy="2308324"/>
+          </a:xfrm>
+          <a:prstGeom prst="rect">
+            <a:avLst/>
+          </a:prstGeom>
+          <a:noFill/>
+        </p:spPr>
+        <p:txBody>
+          <a:bodyPr wrap="square" rtlCol="0">
+            <a:spAutoFit/>
+          </a:bodyPr>
+          <a:lstStyle/>
+          <a:p>
+            <a:pPr marL="285750" indent="-285750">
+              <a:buFont typeface="Arial" panose="020B0604020202020204" pitchFamily="34" charset="0"/>
+              <a:buChar char="•"/>
+            </a:pPr>
+            <a:r>
+              <a:rPr lang="en-US" sz="2400" dirty="0"/>
+              <a:t>.NET provides Cross Platform </a:t>
+            </a:r>
+          </a:p>
+          <a:p>
+            <a:pPr marL="285750" indent="-285750">
+              <a:buFont typeface="Arial" panose="020B0604020202020204" pitchFamily="34" charset="0"/>
+              <a:buChar char="•"/>
+            </a:pPr>
+            <a:r>
+              <a:rPr lang="en-US" sz="2400" dirty="0"/>
+              <a:t>Azure allows secure remote connection to database</a:t>
+            </a:r>
+          </a:p>
+          <a:p>
+            <a:pPr marL="285750" indent="-285750">
+              <a:buFont typeface="Arial" panose="020B0604020202020204" pitchFamily="34" charset="0"/>
+              <a:buChar char="•"/>
+            </a:pPr>
+            <a:r>
+              <a:rPr lang="en-US" sz="2400" dirty="0"/>
+              <a:t>Xamarin offers more functions and can capture mobile functions.</a:t>
+            </a:r>
+          </a:p>
+        </p:txBody>
+      </p:sp>
+    </p:spTree>
+    <p:extLst>
+      <p:ext uri="{BB962C8B-B14F-4D97-AF65-F5344CB8AC3E}">
+        <p14:creationId xmlns:p14="http://schemas.microsoft.com/office/powerpoint/2010/main" val="684134583"/>
+      </p:ext>
+    </p:extLst>
+  </p:cSld>
+  <p:clrMapOvr>
+    <a:masterClrMapping/>
+  </p:clrMapOvr>
+</p:sld>
+</file>
+
+<file path=ppt/slides/slide12.xml><?xml version="1.0" encoding="utf-8"?>
+<p:sld xmlns:a="http://schemas.openxmlformats.org/drawingml/2006/main" xmlns:r="http://schemas.openxmlformats.org/officeDocument/2006/relationships" xmlns:p="http://schemas.openxmlformats.org/presentationml/2006/main">
+  <p:cSld>
+    <p:spTree>
+      <p:nvGrpSpPr>
+        <p:cNvPr id="1" name=""/>
+        <p:cNvGrpSpPr/>
+        <p:nvPr/>
+      </p:nvGrpSpPr>
+      <p:grpSpPr>
+        <a:xfrm>
+          <a:off x="0" y="0"/>
+          <a:ext cx="0" cy="0"/>
+          <a:chOff x="0" y="0"/>
+          <a:chExt cx="0" cy="0"/>
+        </a:xfrm>
+      </p:grpSpPr>
+      <p:sp>
+        <p:nvSpPr>
+          <p:cNvPr id="2" name="Title 1">
+            <a:extLst>
+              <a:ext uri="{FF2B5EF4-FFF2-40B4-BE49-F238E27FC236}">
                 <a16:creationId xmlns:a16="http://schemas.microsoft.com/office/drawing/2014/main" id="{7537AEA4-F075-4576-B563-32CA4945037C}"/>
               </a:ext>
             </a:extLst>
@@ -4490,7 +3908,7 @@
 </p:sld>
 </file>
 
-<file path=ppt/slides/slide12.xml><?xml version="1.0" encoding="utf-8"?>
+<file path=ppt/slides/slide13.xml><?xml version="1.0" encoding="utf-8"?>
 <p:sld xmlns:a="http://schemas.openxmlformats.org/drawingml/2006/main" xmlns:r="http://schemas.openxmlformats.org/officeDocument/2006/relationships" xmlns:p="http://schemas.openxmlformats.org/presentationml/2006/main">
   <p:cSld>
     <p:spTree>
@@ -4726,7 +4144,7 @@
           <p:cNvPr id="2" name="Title 1">
             <a:extLst>
               <a:ext uri="{FF2B5EF4-FFF2-40B4-BE49-F238E27FC236}">
-                <a16:creationId xmlns:a16="http://schemas.microsoft.com/office/drawing/2014/main" id="{79C571FD-DFB4-4F2E-8442-3A9C3AE15938}"/>
+                <a16:creationId xmlns:a16="http://schemas.microsoft.com/office/drawing/2014/main" id="{CAC786BC-379A-49E8-A3CE-2C1AD529D1BB}"/>
               </a:ext>
             </a:extLst>
           </p:cNvPr>
@@ -4752,57 +4170,147 @@
       </p:sp>
       <p:sp>
         <p:nvSpPr>
-          <p:cNvPr id="3" name="Content Placeholder 2">
-            <a:extLst>
-              <a:ext uri="{FF2B5EF4-FFF2-40B4-BE49-F238E27FC236}">
-                <a16:creationId xmlns:a16="http://schemas.microsoft.com/office/drawing/2014/main" id="{946CC509-B363-4853-B58E-B8A4B205BDE9}"/>
-              </a:ext>
-            </a:extLst>
-          </p:cNvPr>
-          <p:cNvSpPr>
-            <a:spLocks noGrp="1"/>
-          </p:cNvSpPr>
-          <p:nvPr>
-            <p:ph idx="1"/>
-          </p:nvPr>
-        </p:nvSpPr>
-        <p:spPr/>
-        <p:txBody>
-          <a:bodyPr/>
-          <a:lstStyle/>
-          <a:p>
-            <a:r>
-              <a:rPr lang="en-US" dirty="0"/>
-              <a:t>Establishes Student Information Handling Procedures </a:t>
-            </a:r>
-          </a:p>
-          <a:p>
-            <a:r>
-              <a:rPr lang="en-US" dirty="0"/>
-              <a:t>Sets Security Minimums on Student Information Storage</a:t>
-            </a:r>
-          </a:p>
-          <a:p>
-            <a:r>
-              <a:rPr lang="en-US" dirty="0"/>
-              <a:t>Sets Data Access Security Requirement Minimums</a:t>
-            </a:r>
-          </a:p>
-          <a:p>
-            <a:r>
-              <a:rPr lang="en-US" dirty="0"/>
-              <a:t>The final say on what kosher when it comes to student information</a:t>
-            </a:r>
-          </a:p>
-          <a:p>
+          <p:cNvPr id="3" name="Text Placeholder 2">
+            <a:extLst>
+              <a:ext uri="{FF2B5EF4-FFF2-40B4-BE49-F238E27FC236}">
+                <a16:creationId xmlns:a16="http://schemas.microsoft.com/office/drawing/2014/main" id="{6556028A-A717-4DCE-A52B-F596104992D9}"/>
+              </a:ext>
+            </a:extLst>
+          </p:cNvPr>
+          <p:cNvSpPr>
+            <a:spLocks noGrp="1"/>
+          </p:cNvSpPr>
+          <p:nvPr>
+            <p:ph type="body" idx="1"/>
+          </p:nvPr>
+        </p:nvSpPr>
+        <p:spPr/>
+        <p:txBody>
+          <a:bodyPr/>
+          <a:lstStyle/>
+          <a:p>
+            <a:r>
+              <a:rPr lang="en-US" dirty="0"/>
+              <a:t>Governs</a:t>
+            </a:r>
+          </a:p>
+        </p:txBody>
+      </p:sp>
+      <p:sp>
+        <p:nvSpPr>
+          <p:cNvPr id="4" name="Content Placeholder 3">
+            <a:extLst>
+              <a:ext uri="{FF2B5EF4-FFF2-40B4-BE49-F238E27FC236}">
+                <a16:creationId xmlns:a16="http://schemas.microsoft.com/office/drawing/2014/main" id="{A5112BE1-3A18-4843-AD80-6D737A577A7F}"/>
+              </a:ext>
+            </a:extLst>
+          </p:cNvPr>
+          <p:cNvSpPr>
+            <a:spLocks noGrp="1"/>
+          </p:cNvSpPr>
+          <p:nvPr>
+            <p:ph sz="half" idx="2"/>
+          </p:nvPr>
+        </p:nvSpPr>
+        <p:spPr/>
+        <p:txBody>
+          <a:bodyPr/>
+          <a:lstStyle/>
+          <a:p>
+            <a:r>
+              <a:rPr lang="en-US" dirty="0"/>
+              <a:t>Student Information Handling Procedures </a:t>
+            </a:r>
+          </a:p>
+          <a:p>
+            <a:r>
+              <a:rPr lang="en-US" dirty="0"/>
+              <a:t>Security Minimums on Information Storage</a:t>
+            </a:r>
+          </a:p>
+          <a:p>
+            <a:r>
+              <a:rPr lang="en-US" dirty="0"/>
+              <a:t>Data Access Requirement Minimums</a:t>
+            </a:r>
+          </a:p>
+          <a:p>
+            <a:pPr marL="0" indent="0">
+              <a:buNone/>
+            </a:pPr>
             <a:endParaRPr lang="en-US" dirty="0"/>
+          </a:p>
+          <a:p>
+            <a:endParaRPr lang="en-US" dirty="0"/>
+          </a:p>
+        </p:txBody>
+      </p:sp>
+      <p:sp>
+        <p:nvSpPr>
+          <p:cNvPr id="5" name="Text Placeholder 4">
+            <a:extLst>
+              <a:ext uri="{FF2B5EF4-FFF2-40B4-BE49-F238E27FC236}">
+                <a16:creationId xmlns:a16="http://schemas.microsoft.com/office/drawing/2014/main" id="{A965EBF9-E242-4A05-9F24-344E03993DD5}"/>
+              </a:ext>
+            </a:extLst>
+          </p:cNvPr>
+          <p:cNvSpPr>
+            <a:spLocks noGrp="1"/>
+          </p:cNvSpPr>
+          <p:nvPr>
+            <p:ph type="body" sz="quarter" idx="3"/>
+          </p:nvPr>
+        </p:nvSpPr>
+        <p:spPr/>
+        <p:txBody>
+          <a:bodyPr/>
+          <a:lstStyle/>
+          <a:p>
+            <a:r>
+              <a:rPr lang="en-US" dirty="0"/>
+              <a:t>Affect on us </a:t>
+            </a:r>
+          </a:p>
+        </p:txBody>
+      </p:sp>
+      <p:sp>
+        <p:nvSpPr>
+          <p:cNvPr id="6" name="Content Placeholder 5">
+            <a:extLst>
+              <a:ext uri="{FF2B5EF4-FFF2-40B4-BE49-F238E27FC236}">
+                <a16:creationId xmlns:a16="http://schemas.microsoft.com/office/drawing/2014/main" id="{243C43AF-131C-4ED2-872F-31927045F7F7}"/>
+              </a:ext>
+            </a:extLst>
+          </p:cNvPr>
+          <p:cNvSpPr>
+            <a:spLocks noGrp="1"/>
+          </p:cNvSpPr>
+          <p:nvPr>
+            <p:ph sz="quarter" idx="4"/>
+          </p:nvPr>
+        </p:nvSpPr>
+        <p:spPr/>
+        <p:txBody>
+          <a:bodyPr/>
+          <a:lstStyle/>
+          <a:p>
+            <a:r>
+              <a:rPr lang="en-US" dirty="0"/>
+              <a:t>The Application Will Be Handling Accounts Tied University Students and Staff </a:t>
+            </a:r>
+          </a:p>
+          <a:p>
+            <a:r>
+              <a:rPr lang="en-US" dirty="0"/>
+              <a:t>It Would Be Preferable To Piggyback Off the North Dakota University System (NDUS) Account System </a:t>
+            </a:r>
           </a:p>
         </p:txBody>
       </p:sp>
     </p:spTree>
     <p:extLst>
       <p:ext uri="{BB962C8B-B14F-4D97-AF65-F5344CB8AC3E}">
-        <p14:creationId xmlns:p14="http://schemas.microsoft.com/office/powerpoint/2010/main" val="1968517323"/>
+        <p14:creationId xmlns:p14="http://schemas.microsoft.com/office/powerpoint/2010/main" val="253005195"/>
       </p:ext>
     </p:extLst>
   </p:cSld>
@@ -4834,7 +4342,7 @@
           <p:cNvPr id="2" name="Title 1">
             <a:extLst>
               <a:ext uri="{FF2B5EF4-FFF2-40B4-BE49-F238E27FC236}">
-                <a16:creationId xmlns:a16="http://schemas.microsoft.com/office/drawing/2014/main" id="{7C50C541-4189-4126-A522-DACC1E59B6B1}"/>
+                <a16:creationId xmlns:a16="http://schemas.microsoft.com/office/drawing/2014/main" id="{34800167-FD47-4A27-BEA4-CD368B38B115}"/>
               </a:ext>
             </a:extLst>
           </p:cNvPr>
@@ -4852,7 +4360,7 @@
           <a:p>
             <a:r>
               <a:rPr lang="en-US" dirty="0"/>
-              <a:t>THD Mobile (Application)</a:t>
+              <a:t>SQL Security Pit Falls (article)</a:t>
             </a:r>
           </a:p>
         </p:txBody>
@@ -4862,7 +4370,7 @@
           <p:cNvPr id="3" name="Text Placeholder 2">
             <a:extLst>
               <a:ext uri="{FF2B5EF4-FFF2-40B4-BE49-F238E27FC236}">
-                <a16:creationId xmlns:a16="http://schemas.microsoft.com/office/drawing/2014/main" id="{78383CFF-948F-47A9-ADBF-2989635B28AE}"/>
+                <a16:creationId xmlns:a16="http://schemas.microsoft.com/office/drawing/2014/main" id="{44873493-9DCC-43A4-978C-A37CACBC786C}"/>
               </a:ext>
             </a:extLst>
           </p:cNvPr>
@@ -4880,7 +4388,7 @@
           <a:p>
             <a:r>
               <a:rPr lang="en-US" dirty="0"/>
-              <a:t>Uses</a:t>
+              <a:t>Covers</a:t>
             </a:r>
           </a:p>
         </p:txBody>
@@ -4890,7 +4398,7 @@
           <p:cNvPr id="4" name="Content Placeholder 3">
             <a:extLst>
               <a:ext uri="{FF2B5EF4-FFF2-40B4-BE49-F238E27FC236}">
-                <a16:creationId xmlns:a16="http://schemas.microsoft.com/office/drawing/2014/main" id="{7850CBD6-9C4C-472E-8A11-F10611121523}"/>
+                <a16:creationId xmlns:a16="http://schemas.microsoft.com/office/drawing/2014/main" id="{003FFD00-4BC9-4E9D-96A1-EF72E5003706}"/>
               </a:ext>
             </a:extLst>
           </p:cNvPr>
@@ -4908,26 +4416,8 @@
           <a:p>
             <a:r>
               <a:rPr lang="en-US" dirty="0"/>
-              <a:t>Inventory Tracking App Used by Housing  </a:t>
-            </a:r>
-          </a:p>
-          <a:p>
-            <a:r>
-              <a:rPr lang="en-US" dirty="0"/>
-              <a:t>A commercial Product Customized for the University</a:t>
-            </a:r>
-          </a:p>
-          <a:p>
-            <a:pPr marL="0" indent="0">
-              <a:buNone/>
-            </a:pPr>
-            <a:r>
-              <a:rPr lang="en-US" dirty="0"/>
-              <a:t> </a:t>
-            </a:r>
-          </a:p>
-          <a:p>
-            <a:endParaRPr lang="en-US" dirty="0"/>
+              <a:t>Highlights Comin Points of Security Failure for SQL Servers </a:t>
+            </a:r>
           </a:p>
         </p:txBody>
       </p:sp>
@@ -4936,7 +4426,7 @@
           <p:cNvPr id="5" name="Text Placeholder 4">
             <a:extLst>
               <a:ext uri="{FF2B5EF4-FFF2-40B4-BE49-F238E27FC236}">
-                <a16:creationId xmlns:a16="http://schemas.microsoft.com/office/drawing/2014/main" id="{D7561C5D-B53D-4A9D-8BD7-A7690EDBCA4F}"/>
+                <a16:creationId xmlns:a16="http://schemas.microsoft.com/office/drawing/2014/main" id="{81E02D4E-6F66-4166-BD7B-168A6D68CA3E}"/>
               </a:ext>
             </a:extLst>
           </p:cNvPr>
@@ -4954,7 +4444,7 @@
           <a:p>
             <a:r>
               <a:rPr lang="en-US" dirty="0"/>
-              <a:t>Acts as an example of:</a:t>
+              <a:t>Affect on us</a:t>
             </a:r>
           </a:p>
         </p:txBody>
@@ -4964,7 +4454,7 @@
           <p:cNvPr id="6" name="Content Placeholder 5">
             <a:extLst>
               <a:ext uri="{FF2B5EF4-FFF2-40B4-BE49-F238E27FC236}">
-                <a16:creationId xmlns:a16="http://schemas.microsoft.com/office/drawing/2014/main" id="{779AC2AA-C062-42F2-A7A9-5E6408607114}"/>
+                <a16:creationId xmlns:a16="http://schemas.microsoft.com/office/drawing/2014/main" id="{CEAC036E-BCB6-4A4A-86C0-0ACB51952F3D}"/>
               </a:ext>
             </a:extLst>
           </p:cNvPr>
@@ -4982,36 +4472,27 @@
           <a:p>
             <a:r>
               <a:rPr lang="en-US" dirty="0"/>
-              <a:t>User Quality of Life Failures </a:t>
-            </a:r>
-          </a:p>
-          <a:p>
-            <a:r>
-              <a:rPr lang="en-US" dirty="0"/>
-              <a:t>UI Design Form Vs. Function</a:t>
-            </a:r>
-          </a:p>
-          <a:p>
-            <a:r>
-              <a:rPr lang="en-US" dirty="0"/>
-              <a:t>Successes and Failures of Information Persistence Between Screens</a:t>
-            </a:r>
-          </a:p>
-          <a:p>
-            <a:r>
-              <a:rPr lang="en-US" dirty="0"/>
-              <a:t>Task Designed for Vs. Task Used for</a:t>
-            </a:r>
-          </a:p>
-          <a:p>
-            <a:endParaRPr lang="en-US" dirty="0"/>
+              <a:t>The Applications Backend Will Be a SQL Server Bring </a:t>
+            </a:r>
+          </a:p>
+          <a:p>
+            <a:r>
+              <a:rPr lang="en-US" dirty="0"/>
+              <a:t>Knowing Possible Points Of Failure Allows For Countermeasures to be taken</a:t>
+            </a:r>
+          </a:p>
+          <a:p>
+            <a:r>
+              <a:rPr lang="en-US" dirty="0"/>
+              <a:t>Some Features Carry Security Requirements </a:t>
+            </a:r>
           </a:p>
         </p:txBody>
       </p:sp>
     </p:spTree>
     <p:extLst>
       <p:ext uri="{BB962C8B-B14F-4D97-AF65-F5344CB8AC3E}">
-        <p14:creationId xmlns:p14="http://schemas.microsoft.com/office/powerpoint/2010/main" val="1851164292"/>
+        <p14:creationId xmlns:p14="http://schemas.microsoft.com/office/powerpoint/2010/main" val="2929340456"/>
       </p:ext>
     </p:extLst>
   </p:cSld>
@@ -5043,7 +4524,7 @@
           <p:cNvPr id="2" name="Title 1">
             <a:extLst>
               <a:ext uri="{FF2B5EF4-FFF2-40B4-BE49-F238E27FC236}">
-                <a16:creationId xmlns:a16="http://schemas.microsoft.com/office/drawing/2014/main" id="{8249F8EF-1D0A-4F82-8B09-5C64B1D9E913}"/>
+                <a16:creationId xmlns:a16="http://schemas.microsoft.com/office/drawing/2014/main" id="{7C50C541-4189-4126-A522-DACC1E59B6B1}"/>
               </a:ext>
             </a:extLst>
           </p:cNvPr>
@@ -5061,63 +4542,166 @@
           <a:p>
             <a:r>
               <a:rPr lang="en-US" dirty="0"/>
-              <a:t>SQL Security Pit Falls + </a:t>
-            </a:r>
-            <a:br>
-              <a:rPr lang="en-US" dirty="0"/>
-            </a:br>
-            <a:r>
-              <a:rPr lang="en-US" i="1" dirty="0"/>
-              <a:t>SQL feature Documentation</a:t>
-            </a:r>
+              <a:t>THD Mobile (Application)</a:t>
+            </a:r>
+          </a:p>
+        </p:txBody>
+      </p:sp>
+      <p:sp>
+        <p:nvSpPr>
+          <p:cNvPr id="3" name="Text Placeholder 2">
+            <a:extLst>
+              <a:ext uri="{FF2B5EF4-FFF2-40B4-BE49-F238E27FC236}">
+                <a16:creationId xmlns:a16="http://schemas.microsoft.com/office/drawing/2014/main" id="{78383CFF-948F-47A9-ADBF-2989635B28AE}"/>
+              </a:ext>
+            </a:extLst>
+          </p:cNvPr>
+          <p:cNvSpPr>
+            <a:spLocks noGrp="1"/>
+          </p:cNvSpPr>
+          <p:nvPr>
+            <p:ph type="body" idx="1"/>
+          </p:nvPr>
+        </p:nvSpPr>
+        <p:spPr/>
+        <p:txBody>
+          <a:bodyPr/>
+          <a:lstStyle/>
+          <a:p>
+            <a:r>
+              <a:rPr lang="en-US" dirty="0"/>
+              <a:t>Uses</a:t>
+            </a:r>
+          </a:p>
+        </p:txBody>
+      </p:sp>
+      <p:sp>
+        <p:nvSpPr>
+          <p:cNvPr id="4" name="Content Placeholder 3">
+            <a:extLst>
+              <a:ext uri="{FF2B5EF4-FFF2-40B4-BE49-F238E27FC236}">
+                <a16:creationId xmlns:a16="http://schemas.microsoft.com/office/drawing/2014/main" id="{7850CBD6-9C4C-472E-8A11-F10611121523}"/>
+              </a:ext>
+            </a:extLst>
+          </p:cNvPr>
+          <p:cNvSpPr>
+            <a:spLocks noGrp="1"/>
+          </p:cNvSpPr>
+          <p:nvPr>
+            <p:ph sz="half" idx="2"/>
+          </p:nvPr>
+        </p:nvSpPr>
+        <p:spPr/>
+        <p:txBody>
+          <a:bodyPr/>
+          <a:lstStyle/>
+          <a:p>
+            <a:r>
+              <a:rPr lang="en-US" dirty="0"/>
+              <a:t>Inventory Tracking App Used by Housing  </a:t>
+            </a:r>
+          </a:p>
+          <a:p>
+            <a:r>
+              <a:rPr lang="en-US" dirty="0"/>
+              <a:t>A commercial Product Customized for the University</a:t>
+            </a:r>
+          </a:p>
+          <a:p>
+            <a:pPr marL="0" indent="0">
+              <a:buNone/>
+            </a:pPr>
+            <a:r>
+              <a:rPr lang="en-US" dirty="0"/>
+              <a:t> </a:t>
+            </a:r>
+          </a:p>
+          <a:p>
             <a:endParaRPr lang="en-US" dirty="0"/>
           </a:p>
         </p:txBody>
       </p:sp>
       <p:sp>
         <p:nvSpPr>
-          <p:cNvPr id="3" name="Content Placeholder 2">
-            <a:extLst>
-              <a:ext uri="{FF2B5EF4-FFF2-40B4-BE49-F238E27FC236}">
-                <a16:creationId xmlns:a16="http://schemas.microsoft.com/office/drawing/2014/main" id="{ECFC4ABF-5B1A-477F-BA66-7C0E95A4CFE3}"/>
-              </a:ext>
-            </a:extLst>
-          </p:cNvPr>
-          <p:cNvSpPr>
-            <a:spLocks noGrp="1"/>
-          </p:cNvSpPr>
-          <p:nvPr>
-            <p:ph idx="1"/>
-          </p:nvPr>
-        </p:nvSpPr>
-        <p:spPr/>
-        <p:txBody>
-          <a:bodyPr/>
-          <a:lstStyle/>
-          <a:p>
-            <a:r>
-              <a:rPr lang="en-US" dirty="0"/>
-              <a:t>The security pit falls articles highlights common points of security failure for SQL servers </a:t>
-            </a:r>
-          </a:p>
-          <a:p>
-            <a:r>
-              <a:rPr lang="en-US" dirty="0"/>
-              <a:t>SQL feature documentation allows us to build in countermeasures to the pit falls highlighted by the articles.</a:t>
-            </a:r>
-          </a:p>
-          <a:p>
-            <a:r>
-              <a:rPr lang="en-US" dirty="0"/>
-              <a:t>Building in countermeasures allows us to comply with FERPA</a:t>
-            </a:r>
+          <p:cNvPr id="5" name="Text Placeholder 4">
+            <a:extLst>
+              <a:ext uri="{FF2B5EF4-FFF2-40B4-BE49-F238E27FC236}">
+                <a16:creationId xmlns:a16="http://schemas.microsoft.com/office/drawing/2014/main" id="{D7561C5D-B53D-4A9D-8BD7-A7690EDBCA4F}"/>
+              </a:ext>
+            </a:extLst>
+          </p:cNvPr>
+          <p:cNvSpPr>
+            <a:spLocks noGrp="1"/>
+          </p:cNvSpPr>
+          <p:nvPr>
+            <p:ph type="body" sz="quarter" idx="3"/>
+          </p:nvPr>
+        </p:nvSpPr>
+        <p:spPr/>
+        <p:txBody>
+          <a:bodyPr/>
+          <a:lstStyle/>
+          <a:p>
+            <a:r>
+              <a:rPr lang="en-US" dirty="0"/>
+              <a:t>Acts as an example of:</a:t>
+            </a:r>
+          </a:p>
+        </p:txBody>
+      </p:sp>
+      <p:sp>
+        <p:nvSpPr>
+          <p:cNvPr id="6" name="Content Placeholder 5">
+            <a:extLst>
+              <a:ext uri="{FF2B5EF4-FFF2-40B4-BE49-F238E27FC236}">
+                <a16:creationId xmlns:a16="http://schemas.microsoft.com/office/drawing/2014/main" id="{779AC2AA-C062-42F2-A7A9-5E6408607114}"/>
+              </a:ext>
+            </a:extLst>
+          </p:cNvPr>
+          <p:cNvSpPr>
+            <a:spLocks noGrp="1"/>
+          </p:cNvSpPr>
+          <p:nvPr>
+            <p:ph sz="quarter" idx="4"/>
+          </p:nvPr>
+        </p:nvSpPr>
+        <p:spPr/>
+        <p:txBody>
+          <a:bodyPr/>
+          <a:lstStyle/>
+          <a:p>
+            <a:r>
+              <a:rPr lang="en-US" dirty="0"/>
+              <a:t>User Quality of Life Failures </a:t>
+            </a:r>
+          </a:p>
+          <a:p>
+            <a:r>
+              <a:rPr lang="en-US" dirty="0"/>
+              <a:t>UI Design Form Vs. Function</a:t>
+            </a:r>
+          </a:p>
+          <a:p>
+            <a:r>
+              <a:rPr lang="en-US" dirty="0"/>
+              <a:t>Successes and Failures of Information Persistence Between Screens</a:t>
+            </a:r>
+          </a:p>
+          <a:p>
+            <a:r>
+              <a:rPr lang="en-US" dirty="0"/>
+              <a:t>Task Designed for Vs. Task Used for</a:t>
+            </a:r>
+          </a:p>
+          <a:p>
+            <a:endParaRPr lang="en-US" dirty="0"/>
           </a:p>
         </p:txBody>
       </p:sp>
     </p:spTree>
     <p:extLst>
       <p:ext uri="{BB962C8B-B14F-4D97-AF65-F5344CB8AC3E}">
-        <p14:creationId xmlns:p14="http://schemas.microsoft.com/office/powerpoint/2010/main" val="2970206587"/>
+        <p14:creationId xmlns:p14="http://schemas.microsoft.com/office/powerpoint/2010/main" val="1851164292"/>
       </p:ext>
     </p:extLst>
   </p:cSld>
@@ -5149,7 +4733,7 @@
           <p:cNvPr id="2" name="Title 1">
             <a:extLst>
               <a:ext uri="{FF2B5EF4-FFF2-40B4-BE49-F238E27FC236}">
-                <a16:creationId xmlns:a16="http://schemas.microsoft.com/office/drawing/2014/main" id="{D6F1348D-05FB-46C4-ACEC-360A0273D052}"/>
+                <a16:creationId xmlns:a16="http://schemas.microsoft.com/office/drawing/2014/main" id="{83DD9894-5F0E-40BC-8759-C1EADF6E2078}"/>
               </a:ext>
             </a:extLst>
           </p:cNvPr>
@@ -5166,60 +4750,146 @@
           <a:lstStyle/>
           <a:p>
             <a:r>
-              <a:rPr lang="en-US" dirty="0"/>
-              <a:t>Google Vision </a:t>
-            </a:r>
-          </a:p>
-        </p:txBody>
-      </p:sp>
-      <p:sp>
-        <p:nvSpPr>
-          <p:cNvPr id="3" name="Content Placeholder 2">
-            <a:extLst>
-              <a:ext uri="{FF2B5EF4-FFF2-40B4-BE49-F238E27FC236}">
-                <a16:creationId xmlns:a16="http://schemas.microsoft.com/office/drawing/2014/main" id="{8B0C7E99-48BC-420C-BEFF-B5E376A3F59C}"/>
-              </a:ext>
-            </a:extLst>
-          </p:cNvPr>
-          <p:cNvSpPr>
-            <a:spLocks noGrp="1"/>
-          </p:cNvSpPr>
-          <p:nvPr>
-            <p:ph idx="1"/>
-          </p:nvPr>
-        </p:nvSpPr>
-        <p:spPr/>
-        <p:txBody>
-          <a:bodyPr/>
-          <a:lstStyle/>
-          <a:p>
-            <a:r>
-              <a:rPr lang="en-US" dirty="0"/>
-              <a:t>Software and API Developed by Google To Detect and Translate Visual Input Including:</a:t>
+              <a:rPr lang="en-US" i="1" dirty="0"/>
+              <a:t>SQL feature Documentation</a:t>
+            </a:r>
+            <a:endParaRPr lang="en-US" dirty="0"/>
+          </a:p>
+        </p:txBody>
+      </p:sp>
+      <p:sp>
+        <p:nvSpPr>
+          <p:cNvPr id="3" name="Text Placeholder 2">
+            <a:extLst>
+              <a:ext uri="{FF2B5EF4-FFF2-40B4-BE49-F238E27FC236}">
+                <a16:creationId xmlns:a16="http://schemas.microsoft.com/office/drawing/2014/main" id="{4F757738-9431-4BA4-98CE-FE348BFD5A1A}"/>
+              </a:ext>
+            </a:extLst>
+          </p:cNvPr>
+          <p:cNvSpPr>
+            <a:spLocks noGrp="1"/>
+          </p:cNvSpPr>
+          <p:nvPr>
+            <p:ph type="body" idx="1"/>
+          </p:nvPr>
+        </p:nvSpPr>
+        <p:spPr/>
+        <p:txBody>
+          <a:bodyPr/>
+          <a:lstStyle/>
+          <a:p>
+            <a:r>
+              <a:rPr lang="en-US" dirty="0"/>
+              <a:t>Covers</a:t>
+            </a:r>
+          </a:p>
+        </p:txBody>
+      </p:sp>
+      <p:sp>
+        <p:nvSpPr>
+          <p:cNvPr id="4" name="Content Placeholder 3">
+            <a:extLst>
+              <a:ext uri="{FF2B5EF4-FFF2-40B4-BE49-F238E27FC236}">
+                <a16:creationId xmlns:a16="http://schemas.microsoft.com/office/drawing/2014/main" id="{990DC752-4349-4D96-A68E-DA1B62EF56CD}"/>
+              </a:ext>
+            </a:extLst>
+          </p:cNvPr>
+          <p:cNvSpPr>
+            <a:spLocks noGrp="1"/>
+          </p:cNvSpPr>
+          <p:nvPr>
+            <p:ph sz="half" idx="2"/>
+          </p:nvPr>
+        </p:nvSpPr>
+        <p:spPr/>
+        <p:txBody>
+          <a:bodyPr/>
+          <a:lstStyle/>
+          <a:p>
+            <a:r>
+              <a:rPr lang="en-US" dirty="0"/>
+              <a:t>All the Features Implemented in SQL </a:t>
+            </a:r>
+          </a:p>
+        </p:txBody>
+      </p:sp>
+      <p:sp>
+        <p:nvSpPr>
+          <p:cNvPr id="5" name="Text Placeholder 4">
+            <a:extLst>
+              <a:ext uri="{FF2B5EF4-FFF2-40B4-BE49-F238E27FC236}">
+                <a16:creationId xmlns:a16="http://schemas.microsoft.com/office/drawing/2014/main" id="{DBAC7B55-1450-4D6E-B6FC-AE6652D00B9E}"/>
+              </a:ext>
+            </a:extLst>
+          </p:cNvPr>
+          <p:cNvSpPr>
+            <a:spLocks noGrp="1"/>
+          </p:cNvSpPr>
+          <p:nvPr>
+            <p:ph type="body" sz="quarter" idx="3"/>
+          </p:nvPr>
+        </p:nvSpPr>
+        <p:spPr/>
+        <p:txBody>
+          <a:bodyPr/>
+          <a:lstStyle/>
+          <a:p>
+            <a:r>
+              <a:rPr lang="en-US" dirty="0"/>
+              <a:t>Affect On Us</a:t>
+            </a:r>
+          </a:p>
+        </p:txBody>
+      </p:sp>
+      <p:sp>
+        <p:nvSpPr>
+          <p:cNvPr id="6" name="Content Placeholder 5">
+            <a:extLst>
+              <a:ext uri="{FF2B5EF4-FFF2-40B4-BE49-F238E27FC236}">
+                <a16:creationId xmlns:a16="http://schemas.microsoft.com/office/drawing/2014/main" id="{723DC586-24A3-4EA5-92FB-97B859677572}"/>
+              </a:ext>
+            </a:extLst>
+          </p:cNvPr>
+          <p:cNvSpPr>
+            <a:spLocks noGrp="1"/>
+          </p:cNvSpPr>
+          <p:nvPr>
+            <p:ph sz="quarter" idx="4"/>
+          </p:nvPr>
+        </p:nvSpPr>
+        <p:spPr/>
+        <p:txBody>
+          <a:bodyPr/>
+          <a:lstStyle/>
+          <a:p>
+            <a:r>
+              <a:rPr lang="en-US" dirty="0"/>
+              <a:t>Provides the tools to be used to:</a:t>
             </a:r>
           </a:p>
           <a:p>
             <a:pPr lvl="1"/>
             <a:r>
               <a:rPr lang="en-US" dirty="0"/>
-              <a:t>Movement</a:t>
+              <a:t>Connect to the application</a:t>
             </a:r>
           </a:p>
           <a:p>
             <a:pPr lvl="1"/>
             <a:r>
               <a:rPr lang="en-US" dirty="0"/>
-              <a:t>Fecal Reignition</a:t>
+              <a:t>Close security holes </a:t>
             </a:r>
           </a:p>
           <a:p>
             <a:pPr lvl="1"/>
             <a:r>
               <a:rPr lang="en-US" dirty="0"/>
-              <a:t>Barcodes  </a:t>
-            </a:r>
-          </a:p>
-          <a:p>
+              <a:t>Connecting to the NDSU servers</a:t>
+            </a:r>
+          </a:p>
+          <a:p>
+            <a:pPr lvl="1"/>
             <a:endParaRPr lang="en-US" dirty="0"/>
           </a:p>
         </p:txBody>
@@ -5227,7 +4897,7 @@
     </p:spTree>
     <p:extLst>
       <p:ext uri="{BB962C8B-B14F-4D97-AF65-F5344CB8AC3E}">
-        <p14:creationId xmlns:p14="http://schemas.microsoft.com/office/powerpoint/2010/main" val="4127931487"/>
+        <p14:creationId xmlns:p14="http://schemas.microsoft.com/office/powerpoint/2010/main" val="877943192"/>
       </p:ext>
     </p:extLst>
   </p:cSld>
@@ -5256,7 +4926,13 @@
       </p:grpSpPr>
       <p:sp>
         <p:nvSpPr>
-          <p:cNvPr id="4" name="Title 3"/>
+          <p:cNvPr id="2" name="Title 1">
+            <a:extLst>
+              <a:ext uri="{FF2B5EF4-FFF2-40B4-BE49-F238E27FC236}">
+                <a16:creationId xmlns:a16="http://schemas.microsoft.com/office/drawing/2014/main" id="{C44D3867-382A-42B4-907C-FA4696DFD077}"/>
+              </a:ext>
+            </a:extLst>
+          </p:cNvPr>
           <p:cNvSpPr>
             <a:spLocks noGrp="1"/>
           </p:cNvSpPr>
@@ -5271,49 +4947,168 @@
           <a:p>
             <a:r>
               <a:rPr lang="en-US" dirty="0"/>
-              <a:t>MySQL vs SQL Server vs SQLite</a:t>
-            </a:r>
-          </a:p>
-        </p:txBody>
-      </p:sp>
-      <p:sp>
-        <p:nvSpPr>
-          <p:cNvPr id="5" name="Content Placeholder 4"/>
-          <p:cNvSpPr>
-            <a:spLocks noGrp="1"/>
-          </p:cNvSpPr>
-          <p:nvPr>
-            <p:ph idx="1"/>
-          </p:nvPr>
-        </p:nvSpPr>
-        <p:spPr/>
-        <p:txBody>
-          <a:bodyPr/>
-          <a:lstStyle/>
-          <a:p>
-            <a:r>
-              <a:rPr lang="en-US" dirty="0"/>
-              <a:t>MySQL is a database software by Oracle. It has Visual studio integration and is cross platform. Has worse performance than SQL Server and SQLite.</a:t>
-            </a:r>
-          </a:p>
-          <a:p>
-            <a:r>
-              <a:rPr lang="en-US" dirty="0"/>
-              <a:t>SQL server is integrated into Visual Studio and Azure, making integration very easy. Can serve reports to mobile devices. This is also cross platform.</a:t>
-            </a:r>
-          </a:p>
-          <a:p>
-            <a:r>
-              <a:rPr lang="en-US" dirty="0"/>
-              <a:t>SQLite is designed to run without a centralized server. This limits size of the database to the size of the storage on the main device. It’s very fast when used on sites and apps with low traffic.</a:t>
-            </a:r>
+              <a:t>Google Vision </a:t>
+            </a:r>
+          </a:p>
+        </p:txBody>
+      </p:sp>
+      <p:sp>
+        <p:nvSpPr>
+          <p:cNvPr id="3" name="Text Placeholder 2">
+            <a:extLst>
+              <a:ext uri="{FF2B5EF4-FFF2-40B4-BE49-F238E27FC236}">
+                <a16:creationId xmlns:a16="http://schemas.microsoft.com/office/drawing/2014/main" id="{32B45193-11D1-4A22-B2EA-7E887073C165}"/>
+              </a:ext>
+            </a:extLst>
+          </p:cNvPr>
+          <p:cNvSpPr>
+            <a:spLocks noGrp="1"/>
+          </p:cNvSpPr>
+          <p:nvPr>
+            <p:ph type="body" idx="1"/>
+          </p:nvPr>
+        </p:nvSpPr>
+        <p:spPr/>
+        <p:txBody>
+          <a:bodyPr/>
+          <a:lstStyle/>
+          <a:p>
+            <a:r>
+              <a:rPr lang="en-US" dirty="0"/>
+              <a:t>What is it  </a:t>
+            </a:r>
+          </a:p>
+        </p:txBody>
+      </p:sp>
+      <p:sp>
+        <p:nvSpPr>
+          <p:cNvPr id="4" name="Content Placeholder 3">
+            <a:extLst>
+              <a:ext uri="{FF2B5EF4-FFF2-40B4-BE49-F238E27FC236}">
+                <a16:creationId xmlns:a16="http://schemas.microsoft.com/office/drawing/2014/main" id="{943846B8-1122-4F70-980F-5B0EC01F0399}"/>
+              </a:ext>
+            </a:extLst>
+          </p:cNvPr>
+          <p:cNvSpPr>
+            <a:spLocks noGrp="1"/>
+          </p:cNvSpPr>
+          <p:nvPr>
+            <p:ph sz="half" idx="2"/>
+          </p:nvPr>
+        </p:nvSpPr>
+        <p:spPr/>
+        <p:txBody>
+          <a:bodyPr/>
+          <a:lstStyle/>
+          <a:p>
+            <a:r>
+              <a:rPr lang="en-US" dirty="0"/>
+              <a:t>API Developed by Google To Detect and Translate Visual Input Including:</a:t>
+            </a:r>
+          </a:p>
+          <a:p>
+            <a:pPr lvl="1"/>
+            <a:r>
+              <a:rPr lang="en-US" dirty="0"/>
+              <a:t>Movement</a:t>
+            </a:r>
+          </a:p>
+          <a:p>
+            <a:pPr lvl="1"/>
+            <a:r>
+              <a:rPr lang="en-US" dirty="0"/>
+              <a:t>Fecal Reignition</a:t>
+            </a:r>
+          </a:p>
+          <a:p>
+            <a:pPr lvl="1"/>
+            <a:r>
+              <a:rPr lang="en-US" dirty="0"/>
+              <a:t>Barcodes  </a:t>
+            </a:r>
+          </a:p>
+          <a:p>
+            <a:pPr lvl="1"/>
+            <a:endParaRPr lang="en-US" dirty="0"/>
+          </a:p>
+          <a:p>
+            <a:pPr lvl="1"/>
+            <a:endParaRPr lang="en-US" dirty="0"/>
+          </a:p>
+        </p:txBody>
+      </p:sp>
+      <p:sp>
+        <p:nvSpPr>
+          <p:cNvPr id="5" name="Text Placeholder 4">
+            <a:extLst>
+              <a:ext uri="{FF2B5EF4-FFF2-40B4-BE49-F238E27FC236}">
+                <a16:creationId xmlns:a16="http://schemas.microsoft.com/office/drawing/2014/main" id="{286D98DF-E0E3-46C0-A1D2-396259BE5242}"/>
+              </a:ext>
+            </a:extLst>
+          </p:cNvPr>
+          <p:cNvSpPr>
+            <a:spLocks noGrp="1"/>
+          </p:cNvSpPr>
+          <p:nvPr>
+            <p:ph type="body" sz="quarter" idx="3"/>
+          </p:nvPr>
+        </p:nvSpPr>
+        <p:spPr/>
+        <p:txBody>
+          <a:bodyPr/>
+          <a:lstStyle/>
+          <a:p>
+            <a:r>
+              <a:rPr lang="en-US" dirty="0"/>
+              <a:t>Affect on us </a:t>
+            </a:r>
+          </a:p>
+        </p:txBody>
+      </p:sp>
+      <p:sp>
+        <p:nvSpPr>
+          <p:cNvPr id="6" name="Content Placeholder 5">
+            <a:extLst>
+              <a:ext uri="{FF2B5EF4-FFF2-40B4-BE49-F238E27FC236}">
+                <a16:creationId xmlns:a16="http://schemas.microsoft.com/office/drawing/2014/main" id="{E1A8A007-62F8-4A47-AF8F-2B4E33D7D327}"/>
+              </a:ext>
+            </a:extLst>
+          </p:cNvPr>
+          <p:cNvSpPr>
+            <a:spLocks noGrp="1"/>
+          </p:cNvSpPr>
+          <p:nvPr>
+            <p:ph sz="quarter" idx="4"/>
+          </p:nvPr>
+        </p:nvSpPr>
+        <p:spPr/>
+        <p:txBody>
+          <a:bodyPr/>
+          <a:lstStyle/>
+          <a:p>
+            <a:r>
+              <a:rPr lang="en-US" dirty="0"/>
+              <a:t>We Need to scan barcodes in a non rescores intensive way</a:t>
+            </a:r>
+          </a:p>
+          <a:p>
+            <a:r>
+              <a:rPr lang="en-US" dirty="0"/>
+              <a:t>Google will Continue to Update This Product and Document it’s Changes</a:t>
+            </a:r>
+          </a:p>
+          <a:p>
+            <a:endParaRPr lang="en-US" dirty="0"/>
+          </a:p>
+          <a:p>
+            <a:endParaRPr lang="en-US" dirty="0"/>
           </a:p>
         </p:txBody>
       </p:sp>
     </p:spTree>
     <p:extLst>
       <p:ext uri="{BB962C8B-B14F-4D97-AF65-F5344CB8AC3E}">
-        <p14:creationId xmlns:p14="http://schemas.microsoft.com/office/powerpoint/2010/main" val="2023964732"/>
+        <p14:creationId xmlns:p14="http://schemas.microsoft.com/office/powerpoint/2010/main" val="2288011464"/>
       </p:ext>
     </p:extLst>
   </p:cSld>
@@ -5342,7 +5137,7 @@
       </p:grpSpPr>
       <p:sp>
         <p:nvSpPr>
-          <p:cNvPr id="2" name="Title 1"/>
+          <p:cNvPr id="4" name="Title 3"/>
           <p:cNvSpPr>
             <a:spLocks noGrp="1"/>
           </p:cNvSpPr>
@@ -5357,14 +5152,14 @@
           <a:p>
             <a:r>
               <a:rPr lang="en-US" dirty="0"/>
-              <a:t>Microsoft Azure</a:t>
-            </a:r>
-          </a:p>
-        </p:txBody>
-      </p:sp>
-      <p:sp>
-        <p:nvSpPr>
-          <p:cNvPr id="3" name="Content Placeholder 2"/>
+              <a:t>MySQL vs SQL Server vs SQLite</a:t>
+            </a:r>
+          </a:p>
+        </p:txBody>
+      </p:sp>
+      <p:sp>
+        <p:nvSpPr>
+          <p:cNvPr id="5" name="Content Placeholder 4"/>
           <p:cNvSpPr>
             <a:spLocks noGrp="1"/>
           </p:cNvSpPr>
@@ -5379,31 +5174,19 @@
           <a:p>
             <a:r>
               <a:rPr lang="en-US" dirty="0"/>
-              <a:t>Provides cloud services to developers to build, deploy, and manage mobile applications.</a:t>
-            </a:r>
-          </a:p>
-          <a:p>
-            <a:r>
-              <a:rPr lang="en-US" dirty="0"/>
-              <a:t>Helps to transition between desktop systems and mobile systems.</a:t>
-            </a:r>
-          </a:p>
-          <a:p>
-            <a:r>
-              <a:rPr lang="en-US" dirty="0"/>
-              <a:t>Allows us to make updates even if connection to the database is lost, then upload the changes when a connection is established.</a:t>
-            </a:r>
-          </a:p>
-          <a:p>
-            <a:r>
-              <a:rPr lang="en-US" dirty="0"/>
-              <a:t>Pricing is based on consumption, the system is only used when needed.</a:t>
-            </a:r>
-          </a:p>
-          <a:p>
-            <a:r>
-              <a:rPr lang="en-US" dirty="0"/>
-              <a:t>Removes the need for IT support and administration.</a:t>
+              <a:t>MySQL is a database software by Oracle. It has Visual studio integration and is cross platform. Has worse performance than SQL Server and SQLite.</a:t>
+            </a:r>
+          </a:p>
+          <a:p>
+            <a:r>
+              <a:rPr lang="en-US" dirty="0"/>
+              <a:t>SQL server is integrated into Visual Studio and Azure, making integration very easy. Can serve reports to mobile devices. This is also cross platform.</a:t>
+            </a:r>
+          </a:p>
+          <a:p>
+            <a:r>
+              <a:rPr lang="en-US" dirty="0"/>
+              <a:t>SQLite is designed to run without a centralized server. This limits size of the database to the size of the storage on the main device. It’s very fast when used on sites and apps with low traffic.</a:t>
             </a:r>
           </a:p>
         </p:txBody>
@@ -5411,7 +5194,7 @@
     </p:spTree>
     <p:extLst>
       <p:ext uri="{BB962C8B-B14F-4D97-AF65-F5344CB8AC3E}">
-        <p14:creationId xmlns:p14="http://schemas.microsoft.com/office/powerpoint/2010/main" val="1106979655"/>
+        <p14:creationId xmlns:p14="http://schemas.microsoft.com/office/powerpoint/2010/main" val="2023964732"/>
       </p:ext>
     </p:extLst>
   </p:cSld>
@@ -5455,7 +5238,7 @@
           <a:p>
             <a:r>
               <a:rPr lang="en-US" dirty="0"/>
-              <a:t>LINQ</a:t>
+              <a:t>Microsoft Azure</a:t>
             </a:r>
           </a:p>
         </p:txBody>
@@ -5477,29 +5260,31 @@
           <a:p>
             <a:r>
               <a:rPr lang="en-US" dirty="0"/>
-              <a:t>Eases the transition from object oriented languages to relational queries.</a:t>
-            </a:r>
-          </a:p>
-          <a:p>
-            <a:r>
-              <a:rPr lang="en-US" dirty="0"/>
-              <a:t>Can write database queries, inserts, updates, and deletes in languages like C# instead of SQL.</a:t>
-            </a:r>
-          </a:p>
-          <a:p>
-            <a:r>
-              <a:rPr lang="en-US" dirty="0"/>
-              <a:t>Integrated into Visual Studio and SQL Server.</a:t>
-            </a:r>
-          </a:p>
-          <a:p>
-            <a:r>
-              <a:rPr lang="en-US" dirty="0"/>
-              <a:t>Allows us to utilize SQL </a:t>
-            </a:r>
-            <a:r>
-              <a:rPr lang="en-US"/>
-              <a:t>Server’s security tools.</a:t>
+              <a:t>Provides cloud services to developers to build, deploy, and manage mobile applications.</a:t>
+            </a:r>
+          </a:p>
+          <a:p>
+            <a:r>
+              <a:rPr lang="en-US" dirty="0"/>
+              <a:t>Helps to transition between desktop systems and mobile systems.</a:t>
+            </a:r>
+          </a:p>
+          <a:p>
+            <a:r>
+              <a:rPr lang="en-US" dirty="0"/>
+              <a:t>Allows us to make updates even if connection to the database is lost, then upload the changes when a connection is established.</a:t>
+            </a:r>
+          </a:p>
+          <a:p>
+            <a:r>
+              <a:rPr lang="en-US" dirty="0"/>
+              <a:t>Pricing is based on consumption, the system is only used when needed.</a:t>
+            </a:r>
+          </a:p>
+          <a:p>
+            <a:r>
+              <a:rPr lang="en-US" dirty="0"/>
+              <a:t>Removes the need for IT support and administration.</a:t>
             </a:r>
           </a:p>
         </p:txBody>
@@ -5507,7 +5292,7 @@
     </p:spTree>
     <p:extLst>
       <p:ext uri="{BB962C8B-B14F-4D97-AF65-F5344CB8AC3E}">
-        <p14:creationId xmlns:p14="http://schemas.microsoft.com/office/powerpoint/2010/main" val="3733634116"/>
+        <p14:creationId xmlns:p14="http://schemas.microsoft.com/office/powerpoint/2010/main" val="1106979655"/>
       </p:ext>
     </p:extLst>
   </p:cSld>
@@ -5810,299 +5595,4 @@
     </a:ext>
   </a:extLst>
 </a:theme>
-</file>
-
-<file path=ppt/theme/theme2.xml><?xml version="1.0" encoding="utf-8"?>
-<a:theme xmlns:a="http://schemas.openxmlformats.org/drawingml/2006/main" name="Office Theme">
-  <a:themeElements>
-    <a:clrScheme name="Office">
-      <a:dk1>
-        <a:sysClr val="windowText" lastClr="000000"/>
-      </a:dk1>
-      <a:lt1>
-        <a:sysClr val="window" lastClr="FFFFFF"/>
-      </a:lt1>
-      <a:dk2>
-        <a:srgbClr val="44546A"/>
-      </a:dk2>
-      <a:lt2>
-        <a:srgbClr val="E7E6E6"/>
-      </a:lt2>
-      <a:accent1>
-        <a:srgbClr val="4472C4"/>
-      </a:accent1>
-      <a:accent2>
-        <a:srgbClr val="ED7D31"/>
-      </a:accent2>
-      <a:accent3>
-        <a:srgbClr val="A5A5A5"/>
-      </a:accent3>
-      <a:accent4>
-        <a:srgbClr val="FFC000"/>
-      </a:accent4>
-      <a:accent5>
-        <a:srgbClr val="5B9BD5"/>
-      </a:accent5>
-      <a:accent6>
-        <a:srgbClr val="70AD47"/>
-      </a:accent6>
-      <a:hlink>
-        <a:srgbClr val="0563C1"/>
-      </a:hlink>
-      <a:folHlink>
-        <a:srgbClr val="954F72"/>
-      </a:folHlink>
-    </a:clrScheme>
-    <a:fontScheme name="Office">
-      <a:majorFont>
-        <a:latin typeface="Calibri Light" panose="020F0302020204030204"/>
-        <a:ea typeface=""/>
-        <a:cs typeface=""/>
-        <a:font script="Jpan" typeface="游ゴシック Light"/>
-        <a:font script="Hang" typeface="맑은 고딕"/>
-        <a:font script="Hans" typeface="等线 Light"/>
-        <a:font script="Hant" typeface="新細明體"/>
-        <a:font script="Arab" typeface="Times New Roman"/>
-        <a:font script="Hebr" typeface="Times New Roman"/>
-        <a:font script="Thai" typeface="Angsana New"/>
-        <a:font script="Ethi" typeface="Nyala"/>
-        <a:font script="Beng" typeface="Vrinda"/>
-        <a:font script="Gujr" typeface="Shruti"/>
-        <a:font script="Khmr" typeface="MoolBoran"/>
-        <a:font script="Knda" typeface="Tunga"/>
-        <a:font script="Guru" typeface="Raavi"/>
-        <a:font script="Cans" typeface="Euphemia"/>
-        <a:font script="Cher" typeface="Plantagenet Cherokee"/>
-        <a:font script="Yiii" typeface="Microsoft Yi Baiti"/>
-        <a:font script="Tibt" typeface="Microsoft Himalaya"/>
-        <a:font script="Thaa" typeface="MV Boli"/>
-        <a:font script="Deva" typeface="Mangal"/>
-        <a:font script="Telu" typeface="Gautami"/>
-        <a:font script="Taml" typeface="Latha"/>
-        <a:font script="Syrc" typeface="Estrangelo Edessa"/>
-        <a:font script="Orya" typeface="Kalinga"/>
-        <a:font script="Mlym" typeface="Kartika"/>
-        <a:font script="Laoo" typeface="DokChampa"/>
-        <a:font script="Sinh" typeface="Iskoola Pota"/>
-        <a:font script="Mong" typeface="Mongolian Baiti"/>
-        <a:font script="Viet" typeface="Times New Roman"/>
-        <a:font script="Uigh" typeface="Microsoft Uighur"/>
-        <a:font script="Geor" typeface="Sylfaen"/>
-        <a:font script="Armn" typeface="Arial"/>
-        <a:font script="Bugi" typeface="Leelawadee UI"/>
-        <a:font script="Bopo" typeface="Microsoft JhengHei"/>
-        <a:font script="Java" typeface="Javanese Text"/>
-        <a:font script="Lisu" typeface="Segoe UI"/>
-        <a:font script="Mymr" typeface="Myanmar Text"/>
-        <a:font script="Nkoo" typeface="Ebrima"/>
-        <a:font script="Olck" typeface="Nirmala UI"/>
-        <a:font script="Osma" typeface="Ebrima"/>
-        <a:font script="Phag" typeface="Phagspa"/>
-        <a:font script="Syrn" typeface="Estrangelo Edessa"/>
-        <a:font script="Syrj" typeface="Estrangelo Edessa"/>
-        <a:font script="Syre" typeface="Estrangelo Edessa"/>
-        <a:font script="Sora" typeface="Nirmala UI"/>
-        <a:font script="Tale" typeface="Microsoft Tai Le"/>
-        <a:font script="Talu" typeface="Microsoft New Tai Lue"/>
-        <a:font script="Tfng" typeface="Ebrima"/>
-      </a:majorFont>
-      <a:minorFont>
-        <a:latin typeface="Calibri" panose="020F0502020204030204"/>
-        <a:ea typeface=""/>
-        <a:cs typeface=""/>
-        <a:font script="Jpan" typeface="游ゴシック"/>
-        <a:font script="Hang" typeface="맑은 고딕"/>
-        <a:font script="Hans" typeface="等线"/>
-        <a:font script="Hant" typeface="新細明體"/>
-        <a:font script="Arab" typeface="Arial"/>
-        <a:font script="Hebr" typeface="Arial"/>
-        <a:font script="Thai" typeface="Cordia New"/>
-        <a:font script="Ethi" typeface="Nyala"/>
-        <a:font script="Beng" typeface="Vrinda"/>
-        <a:font script="Gujr" typeface="Shruti"/>
-        <a:font script="Khmr" typeface="DaunPenh"/>
-        <a:font script="Knda" typeface="Tunga"/>
-        <a:font script="Guru" typeface="Raavi"/>
-        <a:font script="Cans" typeface="Euphemia"/>
-        <a:font script="Cher" typeface="Plantagenet Cherokee"/>
-        <a:font script="Yiii" typeface="Microsoft Yi Baiti"/>
-        <a:font script="Tibt" typeface="Microsoft Himalaya"/>
-        <a:font script="Thaa" typeface="MV Boli"/>
-        <a:font script="Deva" typeface="Mangal"/>
-        <a:font script="Telu" typeface="Gautami"/>
-        <a:font script="Taml" typeface="Latha"/>
-        <a:font script="Syrc" typeface="Estrangelo Edessa"/>
-        <a:font script="Orya" typeface="Kalinga"/>
-        <a:font script="Mlym" typeface="Kartika"/>
-        <a:font script="Laoo" typeface="DokChampa"/>
-        <a:font script="Sinh" typeface="Iskoola Pota"/>
-        <a:font script="Mong" typeface="Mongolian Baiti"/>
-        <a:font script="Viet" typeface="Arial"/>
-        <a:font script="Uigh" typeface="Microsoft Uighur"/>
-        <a:font script="Geor" typeface="Sylfaen"/>
-        <a:font script="Armn" typeface="Arial"/>
-        <a:font script="Bugi" typeface="Leelawadee UI"/>
-        <a:font script="Bopo" typeface="Microsoft JhengHei"/>
-        <a:font script="Java" typeface="Javanese Text"/>
-        <a:font script="Lisu" typeface="Segoe UI"/>
-        <a:font script="Mymr" typeface="Myanmar Text"/>
-        <a:font script="Nkoo" typeface="Ebrima"/>
-        <a:font script="Olck" typeface="Nirmala UI"/>
-        <a:font script="Osma" typeface="Ebrima"/>
-        <a:font script="Phag" typeface="Phagspa"/>
-        <a:font script="Syrn" typeface="Estrangelo Edessa"/>
-        <a:font script="Syrj" typeface="Estrangelo Edessa"/>
-        <a:font script="Syre" typeface="Estrangelo Edessa"/>
-        <a:font script="Sora" typeface="Nirmala UI"/>
-        <a:font script="Tale" typeface="Microsoft Tai Le"/>
-        <a:font script="Talu" typeface="Microsoft New Tai Lue"/>
-        <a:font script="Tfng" typeface="Ebrima"/>
-      </a:minorFont>
-    </a:fontScheme>
-    <a:fmtScheme name="Office">
-      <a:fillStyleLst>
-        <a:solidFill>
-          <a:schemeClr val="phClr"/>
-        </a:solidFill>
-        <a:gradFill rotWithShape="1">
-          <a:gsLst>
-            <a:gs pos="0">
-              <a:schemeClr val="phClr">
-                <a:lumMod val="110000"/>
-                <a:satMod val="105000"/>
-                <a:tint val="67000"/>
-              </a:schemeClr>
-            </a:gs>
-            <a:gs pos="50000">
-              <a:schemeClr val="phClr">
-                <a:lumMod val="105000"/>
-                <a:satMod val="103000"/>
-                <a:tint val="73000"/>
-              </a:schemeClr>
-            </a:gs>
-            <a:gs pos="100000">
-              <a:schemeClr val="phClr">
-                <a:lumMod val="105000"/>
-                <a:satMod val="109000"/>
-                <a:tint val="81000"/>
-              </a:schemeClr>
-            </a:gs>
-          </a:gsLst>
-          <a:lin ang="5400000" scaled="0"/>
-        </a:gradFill>
-        <a:gradFill rotWithShape="1">
-          <a:gsLst>
-            <a:gs pos="0">
-              <a:schemeClr val="phClr">
-                <a:satMod val="103000"/>
-                <a:lumMod val="102000"/>
-                <a:tint val="94000"/>
-              </a:schemeClr>
-            </a:gs>
-            <a:gs pos="50000">
-              <a:schemeClr val="phClr">
-                <a:satMod val="110000"/>
-                <a:lumMod val="100000"/>
-                <a:shade val="100000"/>
-              </a:schemeClr>
-            </a:gs>
-            <a:gs pos="100000">
-              <a:schemeClr val="phClr">
-                <a:lumMod val="99000"/>
-                <a:satMod val="120000"/>
-                <a:shade val="78000"/>
-              </a:schemeClr>
-            </a:gs>
-          </a:gsLst>
-          <a:lin ang="5400000" scaled="0"/>
-        </a:gradFill>
-      </a:fillStyleLst>
-      <a:lnStyleLst>
-        <a:ln w="6350" cap="flat" cmpd="sng" algn="ctr">
-          <a:solidFill>
-            <a:schemeClr val="phClr"/>
-          </a:solidFill>
-          <a:prstDash val="solid"/>
-          <a:miter lim="800000"/>
-        </a:ln>
-        <a:ln w="12700" cap="flat" cmpd="sng" algn="ctr">
-          <a:solidFill>
-            <a:schemeClr val="phClr"/>
-          </a:solidFill>
-          <a:prstDash val="solid"/>
-          <a:miter lim="800000"/>
-        </a:ln>
-        <a:ln w="19050" cap="flat" cmpd="sng" algn="ctr">
-          <a:solidFill>
-            <a:schemeClr val="phClr"/>
-          </a:solidFill>
-          <a:prstDash val="solid"/>
-          <a:miter lim="800000"/>
-        </a:ln>
-      </a:lnStyleLst>
-      <a:effectStyleLst>
-        <a:effectStyle>
-          <a:effectLst/>
-        </a:effectStyle>
-        <a:effectStyle>
-          <a:effectLst/>
-        </a:effectStyle>
-        <a:effectStyle>
-          <a:effectLst>
-            <a:outerShdw blurRad="57150" dist="19050" dir="5400000" algn="ctr" rotWithShape="0">
-              <a:srgbClr val="000000">
-                <a:alpha val="63000"/>
-              </a:srgbClr>
-            </a:outerShdw>
-          </a:effectLst>
-        </a:effectStyle>
-      </a:effectStyleLst>
-      <a:bgFillStyleLst>
-        <a:solidFill>
-          <a:schemeClr val="phClr"/>
-        </a:solidFill>
-        <a:solidFill>
-          <a:schemeClr val="phClr">
-            <a:tint val="95000"/>
-            <a:satMod val="170000"/>
-          </a:schemeClr>
-        </a:solidFill>
-        <a:gradFill rotWithShape="1">
-          <a:gsLst>
-            <a:gs pos="0">
-              <a:schemeClr val="phClr">
-                <a:tint val="93000"/>
-                <a:satMod val="150000"/>
-                <a:shade val="98000"/>
-                <a:lumMod val="102000"/>
-              </a:schemeClr>
-            </a:gs>
-            <a:gs pos="50000">
-              <a:schemeClr val="phClr">
-                <a:tint val="98000"/>
-                <a:satMod val="130000"/>
-                <a:shade val="90000"/>
-                <a:lumMod val="103000"/>
-              </a:schemeClr>
-            </a:gs>
-            <a:gs pos="100000">
-              <a:schemeClr val="phClr">
-                <a:shade val="63000"/>
-                <a:satMod val="120000"/>
-              </a:schemeClr>
-            </a:gs>
-          </a:gsLst>
-          <a:lin ang="5400000" scaled="0"/>
-        </a:gradFill>
-      </a:bgFillStyleLst>
-    </a:fmtScheme>
-  </a:themeElements>
-  <a:objectDefaults/>
-  <a:extraClrSchemeLst/>
-  <a:extLst>
-    <a:ext uri="{05A4C25C-085E-4340-85A3-A5531E510DB2}">
-      <thm15:themeFamily xmlns:thm15="http://schemas.microsoft.com/office/thememl/2012/main" name="Office Theme" id="{62F939B6-93AF-4DB8-9C6B-D6C7DFDC589F}" vid="{4A3C46E8-61CC-4603-A589-7422A47A8E4A}"/>
-    </a:ext>
-  </a:extLst>
-</a:theme>
 </file>
</xml_diff>